<commit_message>
Update gitbook 2023-01-06 15:07:52
</commit_message>
<xml_diff>
--- a/MainEvents/HackathonSignage.pptx
+++ b/MainEvents/HackathonSignage.pptx
@@ -5,71 +5,76 @@
     <p:sldMasterId id="2147483679" r:id="rId1"/>
   </p:sldMasterIdLst>
   <p:notesMasterIdLst>
-    <p:notesMasterId r:id="rId50"/>
+    <p:notesMasterId r:id="rId55"/>
   </p:notesMasterIdLst>
   <p:sldIdLst>
-    <p:sldId id="306" r:id="rId2"/>
-    <p:sldId id="307" r:id="rId3"/>
-    <p:sldId id="375" r:id="rId4"/>
-    <p:sldId id="328" r:id="rId5"/>
-    <p:sldId id="330" r:id="rId6"/>
-    <p:sldId id="329" r:id="rId7"/>
-    <p:sldId id="331" r:id="rId8"/>
-    <p:sldId id="332" r:id="rId9"/>
-    <p:sldId id="333" r:id="rId10"/>
-    <p:sldId id="334" r:id="rId11"/>
-    <p:sldId id="335" r:id="rId12"/>
-    <p:sldId id="336" r:id="rId13"/>
-    <p:sldId id="337" r:id="rId14"/>
-    <p:sldId id="338" r:id="rId15"/>
-    <p:sldId id="339" r:id="rId16"/>
-    <p:sldId id="340" r:id="rId17"/>
-    <p:sldId id="341" r:id="rId18"/>
-    <p:sldId id="342" r:id="rId19"/>
-    <p:sldId id="343" r:id="rId20"/>
-    <p:sldId id="344" r:id="rId21"/>
-    <p:sldId id="345" r:id="rId22"/>
-    <p:sldId id="346" r:id="rId23"/>
-    <p:sldId id="308" r:id="rId24"/>
-    <p:sldId id="351" r:id="rId25"/>
-    <p:sldId id="352" r:id="rId26"/>
-    <p:sldId id="353" r:id="rId27"/>
-    <p:sldId id="354" r:id="rId28"/>
-    <p:sldId id="355" r:id="rId29"/>
-    <p:sldId id="356" r:id="rId30"/>
-    <p:sldId id="357" r:id="rId31"/>
-    <p:sldId id="358" r:id="rId32"/>
-    <p:sldId id="359" r:id="rId33"/>
-    <p:sldId id="360" r:id="rId34"/>
-    <p:sldId id="361" r:id="rId35"/>
-    <p:sldId id="362" r:id="rId36"/>
-    <p:sldId id="363" r:id="rId37"/>
-    <p:sldId id="364" r:id="rId38"/>
-    <p:sldId id="365" r:id="rId39"/>
-    <p:sldId id="366" r:id="rId40"/>
-    <p:sldId id="374" r:id="rId41"/>
-    <p:sldId id="322" r:id="rId42"/>
-    <p:sldId id="373" r:id="rId43"/>
-    <p:sldId id="367" r:id="rId44"/>
-    <p:sldId id="368" r:id="rId45"/>
-    <p:sldId id="369" r:id="rId46"/>
-    <p:sldId id="370" r:id="rId47"/>
-    <p:sldId id="371" r:id="rId48"/>
-    <p:sldId id="372" r:id="rId49"/>
+    <p:sldId id="380" r:id="rId2"/>
+    <p:sldId id="379" r:id="rId3"/>
+    <p:sldId id="376" r:id="rId4"/>
+    <p:sldId id="377" r:id="rId5"/>
+    <p:sldId id="378" r:id="rId6"/>
+    <p:sldId id="306" r:id="rId7"/>
+    <p:sldId id="307" r:id="rId8"/>
+    <p:sldId id="375" r:id="rId9"/>
+    <p:sldId id="328" r:id="rId10"/>
+    <p:sldId id="330" r:id="rId11"/>
+    <p:sldId id="329" r:id="rId12"/>
+    <p:sldId id="331" r:id="rId13"/>
+    <p:sldId id="332" r:id="rId14"/>
+    <p:sldId id="333" r:id="rId15"/>
+    <p:sldId id="334" r:id="rId16"/>
+    <p:sldId id="335" r:id="rId17"/>
+    <p:sldId id="336" r:id="rId18"/>
+    <p:sldId id="337" r:id="rId19"/>
+    <p:sldId id="338" r:id="rId20"/>
+    <p:sldId id="339" r:id="rId21"/>
+    <p:sldId id="340" r:id="rId22"/>
+    <p:sldId id="341" r:id="rId23"/>
+    <p:sldId id="342" r:id="rId24"/>
+    <p:sldId id="343" r:id="rId25"/>
+    <p:sldId id="344" r:id="rId26"/>
+    <p:sldId id="345" r:id="rId27"/>
+    <p:sldId id="346" r:id="rId28"/>
+    <p:sldId id="308" r:id="rId29"/>
+    <p:sldId id="351" r:id="rId30"/>
+    <p:sldId id="352" r:id="rId31"/>
+    <p:sldId id="353" r:id="rId32"/>
+    <p:sldId id="354" r:id="rId33"/>
+    <p:sldId id="355" r:id="rId34"/>
+    <p:sldId id="356" r:id="rId35"/>
+    <p:sldId id="357" r:id="rId36"/>
+    <p:sldId id="358" r:id="rId37"/>
+    <p:sldId id="359" r:id="rId38"/>
+    <p:sldId id="360" r:id="rId39"/>
+    <p:sldId id="361" r:id="rId40"/>
+    <p:sldId id="362" r:id="rId41"/>
+    <p:sldId id="363" r:id="rId42"/>
+    <p:sldId id="364" r:id="rId43"/>
+    <p:sldId id="365" r:id="rId44"/>
+    <p:sldId id="366" r:id="rId45"/>
+    <p:sldId id="374" r:id="rId46"/>
+    <p:sldId id="322" r:id="rId47"/>
+    <p:sldId id="373" r:id="rId48"/>
+    <p:sldId id="367" r:id="rId49"/>
+    <p:sldId id="368" r:id="rId50"/>
+    <p:sldId id="369" r:id="rId51"/>
+    <p:sldId id="370" r:id="rId52"/>
+    <p:sldId id="371" r:id="rId53"/>
+    <p:sldId id="372" r:id="rId54"/>
   </p:sldIdLst>
   <p:sldSz cx="10058400" cy="7772400"/>
   <p:notesSz cx="7010400" cy="9296400"/>
   <p:embeddedFontLst>
     <p:embeddedFont>
       <p:font typeface="Exo 2" panose="020B0604020202020204" charset="0"/>
-      <p:regular r:id="rId51"/>
-      <p:bold r:id="rId52"/>
-      <p:italic r:id="rId53"/>
-      <p:boldItalic r:id="rId54"/>
+      <p:regular r:id="rId56"/>
+      <p:bold r:id="rId57"/>
+      <p:italic r:id="rId58"/>
+      <p:boldItalic r:id="rId59"/>
     </p:embeddedFont>
     <p:embeddedFont>
       <p:font typeface="Yellowtail" panose="020B0604020202020204" charset="0"/>
-      <p:regular r:id="rId55"/>
+      <p:regular r:id="rId60"/>
     </p:embeddedFont>
   </p:embeddedFontLst>
   <p:defaultTextStyle>
@@ -2761,13 +2766,13 @@
           <a:p>
             <a:pPr algn="ctr"/>
             <a:r>
-              <a:rPr lang="en-US" sz="12650" b="1" dirty="0">
+              <a:rPr lang="en-US" sz="8000" b="1" dirty="0">
                 <a:solidFill>
                   <a:schemeClr val="tx2"/>
                 </a:solidFill>
                 <a:latin typeface="Exo 2" panose="020B0604020202020204" charset="0"/>
               </a:rPr>
-              <a:t>Auditorium</a:t>
+              <a:t>Supervision by Hyland Employees Required on Court</a:t>
             </a:r>
           </a:p>
         </p:txBody>
@@ -2824,7 +2829,7 @@
     </p:spTree>
     <p:extLst>
       <p:ext uri="{BB962C8B-B14F-4D97-AF65-F5344CB8AC3E}">
-        <p14:creationId xmlns:p14="http://schemas.microsoft.com/office/powerpoint/2010/main" val="593694673"/>
+        <p14:creationId xmlns:p14="http://schemas.microsoft.com/office/powerpoint/2010/main" val="2013156871"/>
       </p:ext>
     </p:extLst>
   </p:cSld>
@@ -2898,13 +2903,13 @@
           <a:p>
             <a:pPr algn="ctr"/>
             <a:r>
-              <a:rPr lang="en-US" sz="12650" b="1" dirty="0">
+              <a:rPr lang="en-US" sz="10560" b="1" dirty="0">
                 <a:solidFill>
                   <a:schemeClr val="tx2"/>
                 </a:solidFill>
                 <a:latin typeface="Exo 2" panose="020B0604020202020204" charset="0"/>
               </a:rPr>
-              <a:t>Bathrooms</a:t>
+              <a:t>Rock &amp; Roll Hall of Fame</a:t>
             </a:r>
           </a:p>
         </p:txBody>
@@ -2961,7 +2966,7 @@
     </p:spTree>
     <p:extLst>
       <p:ext uri="{BB962C8B-B14F-4D97-AF65-F5344CB8AC3E}">
-        <p14:creationId xmlns:p14="http://schemas.microsoft.com/office/powerpoint/2010/main" val="3739278867"/>
+        <p14:creationId xmlns:p14="http://schemas.microsoft.com/office/powerpoint/2010/main" val="784875926"/>
       </p:ext>
     </p:extLst>
   </p:cSld>
@@ -3035,13 +3040,13 @@
           <a:p>
             <a:pPr algn="ctr"/>
             <a:r>
-              <a:rPr lang="en-US" sz="12650" b="1" dirty="0">
+              <a:rPr lang="en-US" sz="10560" b="1" dirty="0">
                 <a:solidFill>
                   <a:schemeClr val="tx2"/>
                 </a:solidFill>
                 <a:latin typeface="Exo 2" panose="020B0604020202020204" charset="0"/>
               </a:rPr>
-              <a:t>Bathrooms &amp; Showers</a:t>
+              <a:t>Pro Football Hall of Fame</a:t>
             </a:r>
           </a:p>
         </p:txBody>
@@ -3098,7 +3103,7 @@
     </p:spTree>
     <p:extLst>
       <p:ext uri="{BB962C8B-B14F-4D97-AF65-F5344CB8AC3E}">
-        <p14:creationId xmlns:p14="http://schemas.microsoft.com/office/powerpoint/2010/main" val="1870304319"/>
+        <p14:creationId xmlns:p14="http://schemas.microsoft.com/office/powerpoint/2010/main" val="2436533205"/>
       </p:ext>
     </p:extLst>
   </p:cSld>
@@ -3178,7 +3183,7 @@
                 </a:solidFill>
                 <a:latin typeface="Exo 2" panose="020B0604020202020204" charset="0"/>
               </a:rPr>
-              <a:t>Break Room</a:t>
+              <a:t>Pro Football Hall of Fame</a:t>
             </a:r>
           </a:p>
         </p:txBody>
@@ -3235,7 +3240,7 @@
     </p:spTree>
     <p:extLst>
       <p:ext uri="{BB962C8B-B14F-4D97-AF65-F5344CB8AC3E}">
-        <p14:creationId xmlns:p14="http://schemas.microsoft.com/office/powerpoint/2010/main" val="385414605"/>
+        <p14:creationId xmlns:p14="http://schemas.microsoft.com/office/powerpoint/2010/main" val="813180451"/>
       </p:ext>
     </p:extLst>
   </p:cSld>
@@ -3309,13 +3314,13 @@
           <a:p>
             <a:pPr algn="ctr"/>
             <a:r>
-              <a:rPr lang="en-US" sz="10560" b="1" dirty="0">
+              <a:rPr lang="en-US" sz="12650" b="1" dirty="0">
                 <a:solidFill>
                   <a:schemeClr val="tx2"/>
                 </a:solidFill>
                 <a:latin typeface="Exo 2" panose="020B0604020202020204" charset="0"/>
               </a:rPr>
-              <a:t>Quiet Room 1</a:t>
+              <a:t>Mentor Room</a:t>
             </a:r>
           </a:p>
         </p:txBody>
@@ -3372,7 +3377,7 @@
     </p:spTree>
     <p:extLst>
       <p:ext uri="{BB962C8B-B14F-4D97-AF65-F5344CB8AC3E}">
-        <p14:creationId xmlns:p14="http://schemas.microsoft.com/office/powerpoint/2010/main" val="3457766966"/>
+        <p14:creationId xmlns:p14="http://schemas.microsoft.com/office/powerpoint/2010/main" val="4246147517"/>
       </p:ext>
     </p:extLst>
   </p:cSld>
@@ -3446,13 +3451,13 @@
           <a:p>
             <a:pPr algn="ctr"/>
             <a:r>
-              <a:rPr lang="en-US" sz="10560" b="1" dirty="0">
+              <a:rPr lang="en-US" sz="12650" b="1" dirty="0">
                 <a:solidFill>
                   <a:schemeClr val="tx2"/>
                 </a:solidFill>
                 <a:latin typeface="Exo 2" panose="020B0604020202020204" charset="0"/>
               </a:rPr>
-              <a:t>Quiet Room 2</a:t>
+              <a:t>Mentor Room</a:t>
             </a:r>
           </a:p>
         </p:txBody>
@@ -3509,7 +3514,7 @@
     </p:spTree>
     <p:extLst>
       <p:ext uri="{BB962C8B-B14F-4D97-AF65-F5344CB8AC3E}">
-        <p14:creationId xmlns:p14="http://schemas.microsoft.com/office/powerpoint/2010/main" val="2686170325"/>
+        <p14:creationId xmlns:p14="http://schemas.microsoft.com/office/powerpoint/2010/main" val="3132036243"/>
       </p:ext>
     </p:extLst>
   </p:cSld>
@@ -3583,13 +3588,13 @@
           <a:p>
             <a:pPr algn="ctr"/>
             <a:r>
-              <a:rPr lang="en-US" sz="10560" b="1" dirty="0">
+              <a:rPr lang="en-US" sz="12650" b="1" dirty="0">
                 <a:solidFill>
                   <a:schemeClr val="tx2"/>
                 </a:solidFill>
                 <a:latin typeface="Exo 2" panose="020B0604020202020204" charset="0"/>
               </a:rPr>
-              <a:t>Quiet Room 3</a:t>
+              <a:t>Bathrooms</a:t>
             </a:r>
           </a:p>
         </p:txBody>
@@ -3646,7 +3651,7 @@
     </p:spTree>
     <p:extLst>
       <p:ext uri="{BB962C8B-B14F-4D97-AF65-F5344CB8AC3E}">
-        <p14:creationId xmlns:p14="http://schemas.microsoft.com/office/powerpoint/2010/main" val="2675203431"/>
+        <p14:creationId xmlns:p14="http://schemas.microsoft.com/office/powerpoint/2010/main" val="3739278867"/>
       </p:ext>
     </p:extLst>
   </p:cSld>
@@ -3720,13 +3725,13 @@
           <a:p>
             <a:pPr algn="ctr"/>
             <a:r>
-              <a:rPr lang="en-US" sz="10560" b="1" dirty="0">
+              <a:rPr lang="en-US" sz="12650" b="1" dirty="0">
                 <a:solidFill>
                   <a:schemeClr val="tx2"/>
                 </a:solidFill>
                 <a:latin typeface="Exo 2" panose="020B0604020202020204" charset="0"/>
               </a:rPr>
-              <a:t>Quiet Room 4</a:t>
+              <a:t>Bathrooms &amp; Showers</a:t>
             </a:r>
           </a:p>
         </p:txBody>
@@ -3783,7 +3788,7 @@
     </p:spTree>
     <p:extLst>
       <p:ext uri="{BB962C8B-B14F-4D97-AF65-F5344CB8AC3E}">
-        <p14:creationId xmlns:p14="http://schemas.microsoft.com/office/powerpoint/2010/main" val="2515535774"/>
+        <p14:creationId xmlns:p14="http://schemas.microsoft.com/office/powerpoint/2010/main" val="1870304319"/>
       </p:ext>
     </p:extLst>
   </p:cSld>
@@ -3863,7 +3868,7 @@
                 </a:solidFill>
                 <a:latin typeface="Exo 2" panose="020B0604020202020204" charset="0"/>
               </a:rPr>
-              <a:t>University of Cincinnati</a:t>
+              <a:t>Break Room</a:t>
             </a:r>
           </a:p>
         </p:txBody>
@@ -3917,78 +3922,10 @@
           </a:p>
         </p:txBody>
       </p:sp>
-      <p:sp>
-        <p:nvSpPr>
-          <p:cNvPr id="2" name="Star: 5 Points 1">
-            <a:extLst>
-              <a:ext uri="{FF2B5EF4-FFF2-40B4-BE49-F238E27FC236}">
-                <a16:creationId xmlns:a16="http://schemas.microsoft.com/office/drawing/2014/main" id="{B4E903A8-46FA-4306-B89F-77F7E7AD59BF}"/>
-              </a:ext>
-            </a:extLst>
-          </p:cNvPr>
-          <p:cNvSpPr/>
-          <p:nvPr/>
-        </p:nvSpPr>
-        <p:spPr>
-          <a:xfrm>
-            <a:off x="116058" y="5103848"/>
-            <a:ext cx="2211505" cy="1982752"/>
-          </a:xfrm>
-          <a:prstGeom prst="star5">
-            <a:avLst>
-              <a:gd name="adj" fmla="val 25340"/>
-              <a:gd name="hf" fmla="val 105146"/>
-              <a:gd name="vf" fmla="val 110557"/>
-            </a:avLst>
-          </a:prstGeom>
-          <a:solidFill>
-            <a:schemeClr val="bg1"/>
-          </a:solidFill>
-          <a:ln>
-            <a:solidFill>
-              <a:schemeClr val="bg1">
-                <a:lumMod val="75000"/>
-              </a:schemeClr>
-            </a:solidFill>
-          </a:ln>
-        </p:spPr>
-        <p:style>
-          <a:lnRef idx="2">
-            <a:schemeClr val="accent4">
-              <a:shade val="50000"/>
-            </a:schemeClr>
-          </a:lnRef>
-          <a:fillRef idx="1">
-            <a:schemeClr val="accent4"/>
-          </a:fillRef>
-          <a:effectRef idx="0">
-            <a:schemeClr val="accent4"/>
-          </a:effectRef>
-          <a:fontRef idx="minor">
-            <a:schemeClr val="lt1"/>
-          </a:fontRef>
-        </p:style>
-        <p:txBody>
-          <a:bodyPr rtlCol="0" anchor="ctr"/>
-          <a:lstStyle/>
-          <a:p>
-            <a:pPr algn="ctr"/>
-            <a:r>
-              <a:rPr lang="en-US" sz="1922" b="1" dirty="0">
-                <a:solidFill>
-                  <a:schemeClr val="accent1"/>
-                </a:solidFill>
-                <a:latin typeface="Exo 2" panose="020B0604020202020204" charset="0"/>
-              </a:rPr>
-              <a:t>Raffle Room</a:t>
-            </a:r>
-          </a:p>
-        </p:txBody>
-      </p:sp>
     </p:spTree>
     <p:extLst>
       <p:ext uri="{BB962C8B-B14F-4D97-AF65-F5344CB8AC3E}">
-        <p14:creationId xmlns:p14="http://schemas.microsoft.com/office/powerpoint/2010/main" val="2238797153"/>
+        <p14:creationId xmlns:p14="http://schemas.microsoft.com/office/powerpoint/2010/main" val="385414605"/>
       </p:ext>
     </p:extLst>
   </p:cSld>
@@ -4068,7 +4005,7 @@
                 </a:solidFill>
                 <a:latin typeface="Exo 2" panose="020B0604020202020204" charset="0"/>
               </a:rPr>
-              <a:t>Bowling Green University</a:t>
+              <a:t>Quiet Room 1</a:t>
             </a:r>
           </a:p>
         </p:txBody>
@@ -4122,78 +4059,10 @@
           </a:p>
         </p:txBody>
       </p:sp>
-      <p:sp>
-        <p:nvSpPr>
-          <p:cNvPr id="2" name="Star: 5 Points 1">
-            <a:extLst>
-              <a:ext uri="{FF2B5EF4-FFF2-40B4-BE49-F238E27FC236}">
-                <a16:creationId xmlns:a16="http://schemas.microsoft.com/office/drawing/2014/main" id="{B4E903A8-46FA-4306-B89F-77F7E7AD59BF}"/>
-              </a:ext>
-            </a:extLst>
-          </p:cNvPr>
-          <p:cNvSpPr/>
-          <p:nvPr/>
-        </p:nvSpPr>
-        <p:spPr>
-          <a:xfrm>
-            <a:off x="116059" y="5103848"/>
-            <a:ext cx="2138768" cy="1910016"/>
-          </a:xfrm>
-          <a:prstGeom prst="star5">
-            <a:avLst>
-              <a:gd name="adj" fmla="val 25340"/>
-              <a:gd name="hf" fmla="val 105146"/>
-              <a:gd name="vf" fmla="val 110557"/>
-            </a:avLst>
-          </a:prstGeom>
-          <a:solidFill>
-            <a:schemeClr val="bg1"/>
-          </a:solidFill>
-          <a:ln>
-            <a:solidFill>
-              <a:schemeClr val="bg1">
-                <a:lumMod val="75000"/>
-              </a:schemeClr>
-            </a:solidFill>
-          </a:ln>
-        </p:spPr>
-        <p:style>
-          <a:lnRef idx="2">
-            <a:schemeClr val="accent4">
-              <a:shade val="50000"/>
-            </a:schemeClr>
-          </a:lnRef>
-          <a:fillRef idx="1">
-            <a:schemeClr val="accent4"/>
-          </a:fillRef>
-          <a:effectRef idx="0">
-            <a:schemeClr val="accent4"/>
-          </a:effectRef>
-          <a:fontRef idx="minor">
-            <a:schemeClr val="lt1"/>
-          </a:fontRef>
-        </p:style>
-        <p:txBody>
-          <a:bodyPr rtlCol="0" anchor="ctr"/>
-          <a:lstStyle/>
-          <a:p>
-            <a:pPr algn="ctr"/>
-            <a:r>
-              <a:rPr lang="en-US" sz="1922" b="1" dirty="0">
-                <a:solidFill>
-                  <a:schemeClr val="accent1"/>
-                </a:solidFill>
-                <a:latin typeface="Exo 2" panose="020B0604020202020204" charset="0"/>
-              </a:rPr>
-              <a:t>Raffle Room</a:t>
-            </a:r>
-          </a:p>
-        </p:txBody>
-      </p:sp>
     </p:spTree>
     <p:extLst>
       <p:ext uri="{BB962C8B-B14F-4D97-AF65-F5344CB8AC3E}">
-        <p14:creationId xmlns:p14="http://schemas.microsoft.com/office/powerpoint/2010/main" val="3726860419"/>
+        <p14:creationId xmlns:p14="http://schemas.microsoft.com/office/powerpoint/2010/main" val="3457766966"/>
       </p:ext>
     </p:extLst>
   </p:cSld>
@@ -4273,7 +4142,7 @@
                 </a:solidFill>
                 <a:latin typeface="Exo 2" panose="020B0604020202020204" charset="0"/>
               </a:rPr>
-              <a:t>University of Toledo</a:t>
+              <a:t>Quiet Room 2</a:t>
             </a:r>
           </a:p>
         </p:txBody>
@@ -4327,78 +4196,10 @@
           </a:p>
         </p:txBody>
       </p:sp>
-      <p:sp>
-        <p:nvSpPr>
-          <p:cNvPr id="2" name="Star: 5 Points 1">
-            <a:extLst>
-              <a:ext uri="{FF2B5EF4-FFF2-40B4-BE49-F238E27FC236}">
-                <a16:creationId xmlns:a16="http://schemas.microsoft.com/office/drawing/2014/main" id="{B4E903A8-46FA-4306-B89F-77F7E7AD59BF}"/>
-              </a:ext>
-            </a:extLst>
-          </p:cNvPr>
-          <p:cNvSpPr/>
-          <p:nvPr/>
-        </p:nvSpPr>
-        <p:spPr>
-          <a:xfrm>
-            <a:off x="116059" y="5103847"/>
-            <a:ext cx="2232286" cy="2034707"/>
-          </a:xfrm>
-          <a:prstGeom prst="star5">
-            <a:avLst>
-              <a:gd name="adj" fmla="val 25340"/>
-              <a:gd name="hf" fmla="val 105146"/>
-              <a:gd name="vf" fmla="val 110557"/>
-            </a:avLst>
-          </a:prstGeom>
-          <a:solidFill>
-            <a:schemeClr val="bg1"/>
-          </a:solidFill>
-          <a:ln>
-            <a:solidFill>
-              <a:schemeClr val="bg1">
-                <a:lumMod val="75000"/>
-              </a:schemeClr>
-            </a:solidFill>
-          </a:ln>
-        </p:spPr>
-        <p:style>
-          <a:lnRef idx="2">
-            <a:schemeClr val="accent4">
-              <a:shade val="50000"/>
-            </a:schemeClr>
-          </a:lnRef>
-          <a:fillRef idx="1">
-            <a:schemeClr val="accent4"/>
-          </a:fillRef>
-          <a:effectRef idx="0">
-            <a:schemeClr val="accent4"/>
-          </a:effectRef>
-          <a:fontRef idx="minor">
-            <a:schemeClr val="lt1"/>
-          </a:fontRef>
-        </p:style>
-        <p:txBody>
-          <a:bodyPr rtlCol="0" anchor="ctr"/>
-          <a:lstStyle/>
-          <a:p>
-            <a:pPr algn="ctr"/>
-            <a:r>
-              <a:rPr lang="en-US" sz="1922" b="1" dirty="0">
-                <a:solidFill>
-                  <a:schemeClr val="accent1"/>
-                </a:solidFill>
-                <a:latin typeface="Exo 2" panose="020B0604020202020204" charset="0"/>
-              </a:rPr>
-              <a:t>Raffle Room</a:t>
-            </a:r>
-          </a:p>
-        </p:txBody>
-      </p:sp>
     </p:spTree>
     <p:extLst>
       <p:ext uri="{BB962C8B-B14F-4D97-AF65-F5344CB8AC3E}">
-        <p14:creationId xmlns:p14="http://schemas.microsoft.com/office/powerpoint/2010/main" val="367798117"/>
+        <p14:creationId xmlns:p14="http://schemas.microsoft.com/office/powerpoint/2010/main" val="2686170325"/>
       </p:ext>
     </p:extLst>
   </p:cSld>
@@ -4472,14 +4273,44 @@
           <a:p>
             <a:pPr algn="ctr"/>
             <a:r>
-              <a:rPr lang="en-US" sz="12650" b="1" dirty="0">
+              <a:rPr lang="en-US" sz="8800" b="1" dirty="0">
                 <a:solidFill>
                   <a:schemeClr val="tx2"/>
                 </a:solidFill>
                 <a:latin typeface="Exo 2" panose="020B0604020202020204" charset="0"/>
               </a:rPr>
-              <a:t>Auditorium</a:t>
-            </a:r>
+              <a:t>Prayer &amp;</a:t>
+            </a:r>
+          </a:p>
+          <a:p>
+            <a:pPr algn="ctr"/>
+            <a:r>
+              <a:rPr lang="en-US" sz="8800" b="1" dirty="0">
+                <a:solidFill>
+                  <a:schemeClr val="tx2"/>
+                </a:solidFill>
+                <a:latin typeface="Exo 2" panose="020B0604020202020204" charset="0"/>
+              </a:rPr>
+              <a:t>Meditation Room</a:t>
+            </a:r>
+          </a:p>
+          <a:p>
+            <a:pPr algn="ctr"/>
+            <a:r>
+              <a:rPr lang="en-US" sz="4400" dirty="0">
+                <a:solidFill>
+                  <a:schemeClr val="tx2"/>
+                </a:solidFill>
+                <a:latin typeface="Exo 2" panose="020B0604020202020204" charset="0"/>
+              </a:rPr>
+              <a:t>(Must ask for permission to use)</a:t>
+            </a:r>
+            <a:endParaRPr lang="en-US" sz="8800" dirty="0">
+              <a:solidFill>
+                <a:schemeClr val="tx2"/>
+              </a:solidFill>
+              <a:latin typeface="Exo 2" panose="020B0604020202020204" charset="0"/>
+            </a:endParaRPr>
           </a:p>
         </p:txBody>
       </p:sp>
@@ -4535,7 +4366,7 @@
     </p:spTree>
     <p:extLst>
       <p:ext uri="{BB962C8B-B14F-4D97-AF65-F5344CB8AC3E}">
-        <p14:creationId xmlns:p14="http://schemas.microsoft.com/office/powerpoint/2010/main" val="3823049249"/>
+        <p14:creationId xmlns:p14="http://schemas.microsoft.com/office/powerpoint/2010/main" val="3089773743"/>
       </p:ext>
     </p:extLst>
   </p:cSld>
@@ -4615,7 +4446,7 @@
                 </a:solidFill>
                 <a:latin typeface="Exo 2" panose="020B0604020202020204" charset="0"/>
               </a:rPr>
-              <a:t>Miami University</a:t>
+              <a:t>Quiet Room 3</a:t>
             </a:r>
           </a:p>
         </p:txBody>
@@ -4669,78 +4500,10 @@
           </a:p>
         </p:txBody>
       </p:sp>
-      <p:sp>
-        <p:nvSpPr>
-          <p:cNvPr id="2" name="Star: 5 Points 1">
-            <a:extLst>
-              <a:ext uri="{FF2B5EF4-FFF2-40B4-BE49-F238E27FC236}">
-                <a16:creationId xmlns:a16="http://schemas.microsoft.com/office/drawing/2014/main" id="{B4E903A8-46FA-4306-B89F-77F7E7AD59BF}"/>
-              </a:ext>
-            </a:extLst>
-          </p:cNvPr>
-          <p:cNvSpPr/>
-          <p:nvPr/>
-        </p:nvSpPr>
-        <p:spPr>
-          <a:xfrm>
-            <a:off x="116059" y="5103847"/>
-            <a:ext cx="2253068" cy="2107443"/>
-          </a:xfrm>
-          <a:prstGeom prst="star5">
-            <a:avLst>
-              <a:gd name="adj" fmla="val 25340"/>
-              <a:gd name="hf" fmla="val 105146"/>
-              <a:gd name="vf" fmla="val 110557"/>
-            </a:avLst>
-          </a:prstGeom>
-          <a:solidFill>
-            <a:schemeClr val="bg1"/>
-          </a:solidFill>
-          <a:ln>
-            <a:solidFill>
-              <a:schemeClr val="bg1">
-                <a:lumMod val="75000"/>
-              </a:schemeClr>
-            </a:solidFill>
-          </a:ln>
-        </p:spPr>
-        <p:style>
-          <a:lnRef idx="2">
-            <a:schemeClr val="accent4">
-              <a:shade val="50000"/>
-            </a:schemeClr>
-          </a:lnRef>
-          <a:fillRef idx="1">
-            <a:schemeClr val="accent4"/>
-          </a:fillRef>
-          <a:effectRef idx="0">
-            <a:schemeClr val="accent4"/>
-          </a:effectRef>
-          <a:fontRef idx="minor">
-            <a:schemeClr val="lt1"/>
-          </a:fontRef>
-        </p:style>
-        <p:txBody>
-          <a:bodyPr rtlCol="0" anchor="ctr"/>
-          <a:lstStyle/>
-          <a:p>
-            <a:pPr algn="ctr"/>
-            <a:r>
-              <a:rPr lang="en-US" sz="1922" b="1" dirty="0">
-                <a:solidFill>
-                  <a:schemeClr val="accent1"/>
-                </a:solidFill>
-                <a:latin typeface="Exo 2" panose="020B0604020202020204" charset="0"/>
-              </a:rPr>
-              <a:t>Raffle Room</a:t>
-            </a:r>
-          </a:p>
-        </p:txBody>
-      </p:sp>
     </p:spTree>
     <p:extLst>
       <p:ext uri="{BB962C8B-B14F-4D97-AF65-F5344CB8AC3E}">
-        <p14:creationId xmlns:p14="http://schemas.microsoft.com/office/powerpoint/2010/main" val="3628082894"/>
+        <p14:creationId xmlns:p14="http://schemas.microsoft.com/office/powerpoint/2010/main" val="2675203431"/>
       </p:ext>
     </p:extLst>
   </p:cSld>
@@ -4820,7 +4583,7 @@
                 </a:solidFill>
                 <a:latin typeface="Exo 2" panose="020B0604020202020204" charset="0"/>
               </a:rPr>
-              <a:t>University of Akron</a:t>
+              <a:t>Quiet Room 4</a:t>
             </a:r>
           </a:p>
         </p:txBody>
@@ -4874,78 +4637,10 @@
           </a:p>
         </p:txBody>
       </p:sp>
-      <p:sp>
-        <p:nvSpPr>
-          <p:cNvPr id="2" name="Star: 5 Points 1">
-            <a:extLst>
-              <a:ext uri="{FF2B5EF4-FFF2-40B4-BE49-F238E27FC236}">
-                <a16:creationId xmlns:a16="http://schemas.microsoft.com/office/drawing/2014/main" id="{B4E903A8-46FA-4306-B89F-77F7E7AD59BF}"/>
-              </a:ext>
-            </a:extLst>
-          </p:cNvPr>
-          <p:cNvSpPr/>
-          <p:nvPr/>
-        </p:nvSpPr>
-        <p:spPr>
-          <a:xfrm>
-            <a:off x="116059" y="5103848"/>
-            <a:ext cx="2315414" cy="2055488"/>
-          </a:xfrm>
-          <a:prstGeom prst="star5">
-            <a:avLst>
-              <a:gd name="adj" fmla="val 25340"/>
-              <a:gd name="hf" fmla="val 105146"/>
-              <a:gd name="vf" fmla="val 110557"/>
-            </a:avLst>
-          </a:prstGeom>
-          <a:solidFill>
-            <a:schemeClr val="bg1"/>
-          </a:solidFill>
-          <a:ln>
-            <a:solidFill>
-              <a:schemeClr val="bg1">
-                <a:lumMod val="75000"/>
-              </a:schemeClr>
-            </a:solidFill>
-          </a:ln>
-        </p:spPr>
-        <p:style>
-          <a:lnRef idx="2">
-            <a:schemeClr val="accent4">
-              <a:shade val="50000"/>
-            </a:schemeClr>
-          </a:lnRef>
-          <a:fillRef idx="1">
-            <a:schemeClr val="accent4"/>
-          </a:fillRef>
-          <a:effectRef idx="0">
-            <a:schemeClr val="accent4"/>
-          </a:effectRef>
-          <a:fontRef idx="minor">
-            <a:schemeClr val="lt1"/>
-          </a:fontRef>
-        </p:style>
-        <p:txBody>
-          <a:bodyPr rtlCol="0" anchor="ctr"/>
-          <a:lstStyle/>
-          <a:p>
-            <a:pPr algn="ctr"/>
-            <a:r>
-              <a:rPr lang="en-US" sz="1922" b="1" dirty="0">
-                <a:solidFill>
-                  <a:schemeClr val="accent1"/>
-                </a:solidFill>
-                <a:latin typeface="Exo 2" panose="020B0604020202020204" charset="0"/>
-              </a:rPr>
-              <a:t>Raffle Room</a:t>
-            </a:r>
-          </a:p>
-        </p:txBody>
-      </p:sp>
     </p:spTree>
     <p:extLst>
       <p:ext uri="{BB962C8B-B14F-4D97-AF65-F5344CB8AC3E}">
-        <p14:creationId xmlns:p14="http://schemas.microsoft.com/office/powerpoint/2010/main" val="2624741305"/>
+        <p14:creationId xmlns:p14="http://schemas.microsoft.com/office/powerpoint/2010/main" val="2515535774"/>
       </p:ext>
     </p:extLst>
   </p:cSld>
@@ -5019,13 +4714,13 @@
           <a:p>
             <a:pPr algn="ctr"/>
             <a:r>
-              <a:rPr lang="en-US" sz="9680" b="1" dirty="0">
+              <a:rPr lang="en-US" sz="10560" b="1" dirty="0">
                 <a:solidFill>
                   <a:schemeClr val="tx2"/>
                 </a:solidFill>
                 <a:latin typeface="Exo 2" panose="020B0604020202020204" charset="0"/>
               </a:rPr>
-              <a:t>Cleveland State University</a:t>
+              <a:t>University of Cincinnati</a:t>
             </a:r>
           </a:p>
         </p:txBody>
@@ -5093,8 +4788,8 @@
         </p:nvSpPr>
         <p:spPr>
           <a:xfrm>
-            <a:off x="116059" y="5103847"/>
-            <a:ext cx="2315414" cy="2034707"/>
+            <a:off x="116058" y="5103848"/>
+            <a:ext cx="2211505" cy="1982752"/>
           </a:xfrm>
           <a:prstGeom prst="star5">
             <a:avLst>
@@ -5150,7 +4845,7 @@
     </p:spTree>
     <p:extLst>
       <p:ext uri="{BB962C8B-B14F-4D97-AF65-F5344CB8AC3E}">
-        <p14:creationId xmlns:p14="http://schemas.microsoft.com/office/powerpoint/2010/main" val="1138266332"/>
+        <p14:creationId xmlns:p14="http://schemas.microsoft.com/office/powerpoint/2010/main" val="2238797153"/>
       </p:ext>
     </p:extLst>
   </p:cSld>
@@ -5191,17 +4886,13 @@
         </p:nvSpPr>
         <p:spPr>
           <a:xfrm>
-            <a:off x="0" y="0"/>
-            <a:ext cx="10058400" cy="7772400"/>
+            <a:off x="0" y="1057275"/>
+            <a:ext cx="10058400" cy="5657850"/>
           </a:xfrm>
           <a:prstGeom prst="rect">
             <a:avLst/>
           </a:prstGeom>
-          <a:solidFill>
-            <a:srgbClr val="CE0058">
-              <a:alpha val="50196"/>
-            </a:srgbClr>
-          </a:solidFill>
+          <a:noFill/>
           <a:ln>
             <a:noFill/>
           </a:ln>
@@ -5228,13 +4919,13 @@
           <a:p>
             <a:pPr algn="ctr"/>
             <a:r>
-              <a:rPr lang="en-US" sz="12650" b="1" dirty="0">
+              <a:rPr lang="en-US" sz="10560" b="1" dirty="0">
                 <a:solidFill>
                   <a:schemeClr val="tx2"/>
                 </a:solidFill>
                 <a:latin typeface="Exo 2" panose="020B0604020202020204" charset="0"/>
               </a:rPr>
-              <a:t>Off Limits</a:t>
+              <a:t>Bowling Green University</a:t>
             </a:r>
           </a:p>
         </p:txBody>
@@ -5288,10 +4979,78 @@
           </a:p>
         </p:txBody>
       </p:sp>
+      <p:sp>
+        <p:nvSpPr>
+          <p:cNvPr id="2" name="Star: 5 Points 1">
+            <a:extLst>
+              <a:ext uri="{FF2B5EF4-FFF2-40B4-BE49-F238E27FC236}">
+                <a16:creationId xmlns:a16="http://schemas.microsoft.com/office/drawing/2014/main" id="{B4E903A8-46FA-4306-B89F-77F7E7AD59BF}"/>
+              </a:ext>
+            </a:extLst>
+          </p:cNvPr>
+          <p:cNvSpPr/>
+          <p:nvPr/>
+        </p:nvSpPr>
+        <p:spPr>
+          <a:xfrm>
+            <a:off x="116059" y="5103848"/>
+            <a:ext cx="2138768" cy="1910016"/>
+          </a:xfrm>
+          <a:prstGeom prst="star5">
+            <a:avLst>
+              <a:gd name="adj" fmla="val 25340"/>
+              <a:gd name="hf" fmla="val 105146"/>
+              <a:gd name="vf" fmla="val 110557"/>
+            </a:avLst>
+          </a:prstGeom>
+          <a:solidFill>
+            <a:schemeClr val="bg1"/>
+          </a:solidFill>
+          <a:ln>
+            <a:solidFill>
+              <a:schemeClr val="bg1">
+                <a:lumMod val="75000"/>
+              </a:schemeClr>
+            </a:solidFill>
+          </a:ln>
+        </p:spPr>
+        <p:style>
+          <a:lnRef idx="2">
+            <a:schemeClr val="accent4">
+              <a:shade val="50000"/>
+            </a:schemeClr>
+          </a:lnRef>
+          <a:fillRef idx="1">
+            <a:schemeClr val="accent4"/>
+          </a:fillRef>
+          <a:effectRef idx="0">
+            <a:schemeClr val="accent4"/>
+          </a:effectRef>
+          <a:fontRef idx="minor">
+            <a:schemeClr val="lt1"/>
+          </a:fontRef>
+        </p:style>
+        <p:txBody>
+          <a:bodyPr rtlCol="0" anchor="ctr"/>
+          <a:lstStyle/>
+          <a:p>
+            <a:pPr algn="ctr"/>
+            <a:r>
+              <a:rPr lang="en-US" sz="1922" b="1" dirty="0">
+                <a:solidFill>
+                  <a:schemeClr val="accent1"/>
+                </a:solidFill>
+                <a:latin typeface="Exo 2" panose="020B0604020202020204" charset="0"/>
+              </a:rPr>
+              <a:t>Raffle Room</a:t>
+            </a:r>
+          </a:p>
+        </p:txBody>
+      </p:sp>
     </p:spTree>
     <p:extLst>
       <p:ext uri="{BB962C8B-B14F-4D97-AF65-F5344CB8AC3E}">
-        <p14:creationId xmlns:p14="http://schemas.microsoft.com/office/powerpoint/2010/main" val="4087984277"/>
+        <p14:creationId xmlns:p14="http://schemas.microsoft.com/office/powerpoint/2010/main" val="3726860419"/>
       </p:ext>
     </p:extLst>
   </p:cSld>
@@ -5332,17 +5091,13 @@
         </p:nvSpPr>
         <p:spPr>
           <a:xfrm>
-            <a:off x="0" y="0"/>
-            <a:ext cx="10058400" cy="7772400"/>
+            <a:off x="0" y="1057275"/>
+            <a:ext cx="10058400" cy="5657850"/>
           </a:xfrm>
           <a:prstGeom prst="rect">
             <a:avLst/>
           </a:prstGeom>
-          <a:solidFill>
-            <a:srgbClr val="CE0058">
-              <a:alpha val="50196"/>
-            </a:srgbClr>
-          </a:solidFill>
+          <a:noFill/>
           <a:ln>
             <a:noFill/>
           </a:ln>
@@ -5369,13 +5124,13 @@
           <a:p>
             <a:pPr algn="ctr"/>
             <a:r>
-              <a:rPr lang="en-US" sz="12650" b="1" dirty="0">
+              <a:rPr lang="en-US" sz="10560" b="1" dirty="0">
                 <a:solidFill>
                   <a:schemeClr val="tx2"/>
                 </a:solidFill>
                 <a:latin typeface="Exo 2" panose="020B0604020202020204" charset="0"/>
               </a:rPr>
-              <a:t>Off Limits</a:t>
+              <a:t>University of Toledo</a:t>
             </a:r>
           </a:p>
         </p:txBody>
@@ -5429,10 +5184,78 @@
           </a:p>
         </p:txBody>
       </p:sp>
+      <p:sp>
+        <p:nvSpPr>
+          <p:cNvPr id="2" name="Star: 5 Points 1">
+            <a:extLst>
+              <a:ext uri="{FF2B5EF4-FFF2-40B4-BE49-F238E27FC236}">
+                <a16:creationId xmlns:a16="http://schemas.microsoft.com/office/drawing/2014/main" id="{B4E903A8-46FA-4306-B89F-77F7E7AD59BF}"/>
+              </a:ext>
+            </a:extLst>
+          </p:cNvPr>
+          <p:cNvSpPr/>
+          <p:nvPr/>
+        </p:nvSpPr>
+        <p:spPr>
+          <a:xfrm>
+            <a:off x="116059" y="5103847"/>
+            <a:ext cx="2232286" cy="2034707"/>
+          </a:xfrm>
+          <a:prstGeom prst="star5">
+            <a:avLst>
+              <a:gd name="adj" fmla="val 25340"/>
+              <a:gd name="hf" fmla="val 105146"/>
+              <a:gd name="vf" fmla="val 110557"/>
+            </a:avLst>
+          </a:prstGeom>
+          <a:solidFill>
+            <a:schemeClr val="bg1"/>
+          </a:solidFill>
+          <a:ln>
+            <a:solidFill>
+              <a:schemeClr val="bg1">
+                <a:lumMod val="75000"/>
+              </a:schemeClr>
+            </a:solidFill>
+          </a:ln>
+        </p:spPr>
+        <p:style>
+          <a:lnRef idx="2">
+            <a:schemeClr val="accent4">
+              <a:shade val="50000"/>
+            </a:schemeClr>
+          </a:lnRef>
+          <a:fillRef idx="1">
+            <a:schemeClr val="accent4"/>
+          </a:fillRef>
+          <a:effectRef idx="0">
+            <a:schemeClr val="accent4"/>
+          </a:effectRef>
+          <a:fontRef idx="minor">
+            <a:schemeClr val="lt1"/>
+          </a:fontRef>
+        </p:style>
+        <p:txBody>
+          <a:bodyPr rtlCol="0" anchor="ctr"/>
+          <a:lstStyle/>
+          <a:p>
+            <a:pPr algn="ctr"/>
+            <a:r>
+              <a:rPr lang="en-US" sz="1922" b="1" dirty="0">
+                <a:solidFill>
+                  <a:schemeClr val="accent1"/>
+                </a:solidFill>
+                <a:latin typeface="Exo 2" panose="020B0604020202020204" charset="0"/>
+              </a:rPr>
+              <a:t>Raffle Room</a:t>
+            </a:r>
+          </a:p>
+        </p:txBody>
+      </p:sp>
     </p:spTree>
     <p:extLst>
       <p:ext uri="{BB962C8B-B14F-4D97-AF65-F5344CB8AC3E}">
-        <p14:creationId xmlns:p14="http://schemas.microsoft.com/office/powerpoint/2010/main" val="2834256618"/>
+        <p14:creationId xmlns:p14="http://schemas.microsoft.com/office/powerpoint/2010/main" val="367798117"/>
       </p:ext>
     </p:extLst>
   </p:cSld>
@@ -5473,17 +5296,13 @@
         </p:nvSpPr>
         <p:spPr>
           <a:xfrm>
-            <a:off x="0" y="0"/>
-            <a:ext cx="10058400" cy="7772400"/>
+            <a:off x="0" y="1057275"/>
+            <a:ext cx="10058400" cy="5657850"/>
           </a:xfrm>
           <a:prstGeom prst="rect">
             <a:avLst/>
           </a:prstGeom>
-          <a:solidFill>
-            <a:srgbClr val="CE0058">
-              <a:alpha val="50196"/>
-            </a:srgbClr>
-          </a:solidFill>
+          <a:noFill/>
           <a:ln>
             <a:noFill/>
           </a:ln>
@@ -5510,13 +5329,13 @@
           <a:p>
             <a:pPr algn="ctr"/>
             <a:r>
-              <a:rPr lang="en-US" sz="12650" b="1" dirty="0">
+              <a:rPr lang="en-US" sz="10560" b="1" dirty="0">
                 <a:solidFill>
                   <a:schemeClr val="tx2"/>
                 </a:solidFill>
                 <a:latin typeface="Exo 2" panose="020B0604020202020204" charset="0"/>
               </a:rPr>
-              <a:t>Off Limits</a:t>
+              <a:t>Miami University</a:t>
             </a:r>
           </a:p>
         </p:txBody>
@@ -5570,10 +5389,78 @@
           </a:p>
         </p:txBody>
       </p:sp>
+      <p:sp>
+        <p:nvSpPr>
+          <p:cNvPr id="2" name="Star: 5 Points 1">
+            <a:extLst>
+              <a:ext uri="{FF2B5EF4-FFF2-40B4-BE49-F238E27FC236}">
+                <a16:creationId xmlns:a16="http://schemas.microsoft.com/office/drawing/2014/main" id="{B4E903A8-46FA-4306-B89F-77F7E7AD59BF}"/>
+              </a:ext>
+            </a:extLst>
+          </p:cNvPr>
+          <p:cNvSpPr/>
+          <p:nvPr/>
+        </p:nvSpPr>
+        <p:spPr>
+          <a:xfrm>
+            <a:off x="116059" y="5103847"/>
+            <a:ext cx="2253068" cy="2107443"/>
+          </a:xfrm>
+          <a:prstGeom prst="star5">
+            <a:avLst>
+              <a:gd name="adj" fmla="val 25340"/>
+              <a:gd name="hf" fmla="val 105146"/>
+              <a:gd name="vf" fmla="val 110557"/>
+            </a:avLst>
+          </a:prstGeom>
+          <a:solidFill>
+            <a:schemeClr val="bg1"/>
+          </a:solidFill>
+          <a:ln>
+            <a:solidFill>
+              <a:schemeClr val="bg1">
+                <a:lumMod val="75000"/>
+              </a:schemeClr>
+            </a:solidFill>
+          </a:ln>
+        </p:spPr>
+        <p:style>
+          <a:lnRef idx="2">
+            <a:schemeClr val="accent4">
+              <a:shade val="50000"/>
+            </a:schemeClr>
+          </a:lnRef>
+          <a:fillRef idx="1">
+            <a:schemeClr val="accent4"/>
+          </a:fillRef>
+          <a:effectRef idx="0">
+            <a:schemeClr val="accent4"/>
+          </a:effectRef>
+          <a:fontRef idx="minor">
+            <a:schemeClr val="lt1"/>
+          </a:fontRef>
+        </p:style>
+        <p:txBody>
+          <a:bodyPr rtlCol="0" anchor="ctr"/>
+          <a:lstStyle/>
+          <a:p>
+            <a:pPr algn="ctr"/>
+            <a:r>
+              <a:rPr lang="en-US" sz="1922" b="1" dirty="0">
+                <a:solidFill>
+                  <a:schemeClr val="accent1"/>
+                </a:solidFill>
+                <a:latin typeface="Exo 2" panose="020B0604020202020204" charset="0"/>
+              </a:rPr>
+              <a:t>Raffle Room</a:t>
+            </a:r>
+          </a:p>
+        </p:txBody>
+      </p:sp>
     </p:spTree>
     <p:extLst>
       <p:ext uri="{BB962C8B-B14F-4D97-AF65-F5344CB8AC3E}">
-        <p14:creationId xmlns:p14="http://schemas.microsoft.com/office/powerpoint/2010/main" val="2761513785"/>
+        <p14:creationId xmlns:p14="http://schemas.microsoft.com/office/powerpoint/2010/main" val="3628082894"/>
       </p:ext>
     </p:extLst>
   </p:cSld>
@@ -5614,17 +5501,13 @@
         </p:nvSpPr>
         <p:spPr>
           <a:xfrm>
-            <a:off x="0" y="0"/>
-            <a:ext cx="10058400" cy="7772400"/>
+            <a:off x="0" y="1057275"/>
+            <a:ext cx="10058400" cy="5657850"/>
           </a:xfrm>
           <a:prstGeom prst="rect">
             <a:avLst/>
           </a:prstGeom>
-          <a:solidFill>
-            <a:srgbClr val="CE0058">
-              <a:alpha val="50196"/>
-            </a:srgbClr>
-          </a:solidFill>
+          <a:noFill/>
           <a:ln>
             <a:noFill/>
           </a:ln>
@@ -5651,13 +5534,13 @@
           <a:p>
             <a:pPr algn="ctr"/>
             <a:r>
-              <a:rPr lang="en-US" sz="12650" b="1" dirty="0">
+              <a:rPr lang="en-US" sz="10560" b="1" dirty="0">
                 <a:solidFill>
                   <a:schemeClr val="tx2"/>
                 </a:solidFill>
                 <a:latin typeface="Exo 2" panose="020B0604020202020204" charset="0"/>
               </a:rPr>
-              <a:t>Off Limits</a:t>
+              <a:t>University of Akron</a:t>
             </a:r>
           </a:p>
         </p:txBody>
@@ -5711,10 +5594,78 @@
           </a:p>
         </p:txBody>
       </p:sp>
+      <p:sp>
+        <p:nvSpPr>
+          <p:cNvPr id="2" name="Star: 5 Points 1">
+            <a:extLst>
+              <a:ext uri="{FF2B5EF4-FFF2-40B4-BE49-F238E27FC236}">
+                <a16:creationId xmlns:a16="http://schemas.microsoft.com/office/drawing/2014/main" id="{B4E903A8-46FA-4306-B89F-77F7E7AD59BF}"/>
+              </a:ext>
+            </a:extLst>
+          </p:cNvPr>
+          <p:cNvSpPr/>
+          <p:nvPr/>
+        </p:nvSpPr>
+        <p:spPr>
+          <a:xfrm>
+            <a:off x="116059" y="5103848"/>
+            <a:ext cx="2315414" cy="2055488"/>
+          </a:xfrm>
+          <a:prstGeom prst="star5">
+            <a:avLst>
+              <a:gd name="adj" fmla="val 25340"/>
+              <a:gd name="hf" fmla="val 105146"/>
+              <a:gd name="vf" fmla="val 110557"/>
+            </a:avLst>
+          </a:prstGeom>
+          <a:solidFill>
+            <a:schemeClr val="bg1"/>
+          </a:solidFill>
+          <a:ln>
+            <a:solidFill>
+              <a:schemeClr val="bg1">
+                <a:lumMod val="75000"/>
+              </a:schemeClr>
+            </a:solidFill>
+          </a:ln>
+        </p:spPr>
+        <p:style>
+          <a:lnRef idx="2">
+            <a:schemeClr val="accent4">
+              <a:shade val="50000"/>
+            </a:schemeClr>
+          </a:lnRef>
+          <a:fillRef idx="1">
+            <a:schemeClr val="accent4"/>
+          </a:fillRef>
+          <a:effectRef idx="0">
+            <a:schemeClr val="accent4"/>
+          </a:effectRef>
+          <a:fontRef idx="minor">
+            <a:schemeClr val="lt1"/>
+          </a:fontRef>
+        </p:style>
+        <p:txBody>
+          <a:bodyPr rtlCol="0" anchor="ctr"/>
+          <a:lstStyle/>
+          <a:p>
+            <a:pPr algn="ctr"/>
+            <a:r>
+              <a:rPr lang="en-US" sz="1922" b="1" dirty="0">
+                <a:solidFill>
+                  <a:schemeClr val="accent1"/>
+                </a:solidFill>
+                <a:latin typeface="Exo 2" panose="020B0604020202020204" charset="0"/>
+              </a:rPr>
+              <a:t>Raffle Room</a:t>
+            </a:r>
+          </a:p>
+        </p:txBody>
+      </p:sp>
     </p:spTree>
     <p:extLst>
       <p:ext uri="{BB962C8B-B14F-4D97-AF65-F5344CB8AC3E}">
-        <p14:creationId xmlns:p14="http://schemas.microsoft.com/office/powerpoint/2010/main" val="640611824"/>
+        <p14:creationId xmlns:p14="http://schemas.microsoft.com/office/powerpoint/2010/main" val="2624741305"/>
       </p:ext>
     </p:extLst>
   </p:cSld>
@@ -5755,17 +5706,13 @@
         </p:nvSpPr>
         <p:spPr>
           <a:xfrm>
-            <a:off x="0" y="0"/>
-            <a:ext cx="10058400" cy="7772400"/>
+            <a:off x="0" y="1057275"/>
+            <a:ext cx="10058400" cy="5657850"/>
           </a:xfrm>
           <a:prstGeom prst="rect">
             <a:avLst/>
           </a:prstGeom>
-          <a:solidFill>
-            <a:srgbClr val="CE0058">
-              <a:alpha val="50196"/>
-            </a:srgbClr>
-          </a:solidFill>
+          <a:noFill/>
           <a:ln>
             <a:noFill/>
           </a:ln>
@@ -5792,13 +5739,13 @@
           <a:p>
             <a:pPr algn="ctr"/>
             <a:r>
-              <a:rPr lang="en-US" sz="12650" b="1" dirty="0">
+              <a:rPr lang="en-US" sz="9680" b="1" dirty="0">
                 <a:solidFill>
                   <a:schemeClr val="tx2"/>
                 </a:solidFill>
                 <a:latin typeface="Exo 2" panose="020B0604020202020204" charset="0"/>
               </a:rPr>
-              <a:t>Off Limits</a:t>
+              <a:t>Cleveland State University</a:t>
             </a:r>
           </a:p>
         </p:txBody>
@@ -5852,10 +5799,78 @@
           </a:p>
         </p:txBody>
       </p:sp>
+      <p:sp>
+        <p:nvSpPr>
+          <p:cNvPr id="2" name="Star: 5 Points 1">
+            <a:extLst>
+              <a:ext uri="{FF2B5EF4-FFF2-40B4-BE49-F238E27FC236}">
+                <a16:creationId xmlns:a16="http://schemas.microsoft.com/office/drawing/2014/main" id="{B4E903A8-46FA-4306-B89F-77F7E7AD59BF}"/>
+              </a:ext>
+            </a:extLst>
+          </p:cNvPr>
+          <p:cNvSpPr/>
+          <p:nvPr/>
+        </p:nvSpPr>
+        <p:spPr>
+          <a:xfrm>
+            <a:off x="116059" y="5103847"/>
+            <a:ext cx="2315414" cy="2034707"/>
+          </a:xfrm>
+          <a:prstGeom prst="star5">
+            <a:avLst>
+              <a:gd name="adj" fmla="val 25340"/>
+              <a:gd name="hf" fmla="val 105146"/>
+              <a:gd name="vf" fmla="val 110557"/>
+            </a:avLst>
+          </a:prstGeom>
+          <a:solidFill>
+            <a:schemeClr val="bg1"/>
+          </a:solidFill>
+          <a:ln>
+            <a:solidFill>
+              <a:schemeClr val="bg1">
+                <a:lumMod val="75000"/>
+              </a:schemeClr>
+            </a:solidFill>
+          </a:ln>
+        </p:spPr>
+        <p:style>
+          <a:lnRef idx="2">
+            <a:schemeClr val="accent4">
+              <a:shade val="50000"/>
+            </a:schemeClr>
+          </a:lnRef>
+          <a:fillRef idx="1">
+            <a:schemeClr val="accent4"/>
+          </a:fillRef>
+          <a:effectRef idx="0">
+            <a:schemeClr val="accent4"/>
+          </a:effectRef>
+          <a:fontRef idx="minor">
+            <a:schemeClr val="lt1"/>
+          </a:fontRef>
+        </p:style>
+        <p:txBody>
+          <a:bodyPr rtlCol="0" anchor="ctr"/>
+          <a:lstStyle/>
+          <a:p>
+            <a:pPr algn="ctr"/>
+            <a:r>
+              <a:rPr lang="en-US" sz="1922" b="1" dirty="0">
+                <a:solidFill>
+                  <a:schemeClr val="accent1"/>
+                </a:solidFill>
+                <a:latin typeface="Exo 2" panose="020B0604020202020204" charset="0"/>
+              </a:rPr>
+              <a:t>Raffle Room</a:t>
+            </a:r>
+          </a:p>
+        </p:txBody>
+      </p:sp>
     </p:spTree>
     <p:extLst>
       <p:ext uri="{BB962C8B-B14F-4D97-AF65-F5344CB8AC3E}">
-        <p14:creationId xmlns:p14="http://schemas.microsoft.com/office/powerpoint/2010/main" val="478431990"/>
+        <p14:creationId xmlns:p14="http://schemas.microsoft.com/office/powerpoint/2010/main" val="1138266332"/>
       </p:ext>
     </p:extLst>
   </p:cSld>
@@ -5996,7 +6011,7 @@
     </p:spTree>
     <p:extLst>
       <p:ext uri="{BB962C8B-B14F-4D97-AF65-F5344CB8AC3E}">
-        <p14:creationId xmlns:p14="http://schemas.microsoft.com/office/powerpoint/2010/main" val="3076896401"/>
+        <p14:creationId xmlns:p14="http://schemas.microsoft.com/office/powerpoint/2010/main" val="4087984277"/>
       </p:ext>
     </p:extLst>
   </p:cSld>
@@ -6137,7 +6152,7 @@
     </p:spTree>
     <p:extLst>
       <p:ext uri="{BB962C8B-B14F-4D97-AF65-F5344CB8AC3E}">
-        <p14:creationId xmlns:p14="http://schemas.microsoft.com/office/powerpoint/2010/main" val="951514696"/>
+        <p14:creationId xmlns:p14="http://schemas.microsoft.com/office/powerpoint/2010/main" val="2834256618"/>
       </p:ext>
     </p:extLst>
   </p:cSld>
@@ -6178,8 +6193,8 @@
         </p:nvSpPr>
         <p:spPr>
           <a:xfrm>
-            <a:off x="0" y="1057275"/>
-            <a:ext cx="10058400" cy="5657850"/>
+            <a:off x="893618" y="1676833"/>
+            <a:ext cx="8271163" cy="4418734"/>
           </a:xfrm>
           <a:prstGeom prst="rect">
             <a:avLst/>
@@ -6209,16 +6224,61 @@
           <a:bodyPr rtlCol="0" anchor="ctr"/>
           <a:lstStyle/>
           <a:p>
-            <a:pPr algn="ctr"/>
-            <a:r>
-              <a:rPr lang="en-US" sz="12650" b="1" dirty="0">
+            <a:pPr>
+              <a:buClr>
+                <a:schemeClr val="tx2"/>
+              </a:buClr>
+              <a:buSzPct val="120000"/>
+            </a:pPr>
+            <a:r>
+              <a:rPr lang="en-US" sz="8800" b="1" dirty="0">
                 <a:solidFill>
                   <a:schemeClr val="tx2"/>
                 </a:solidFill>
                 <a:latin typeface="Exo 2" panose="020B0604020202020204" charset="0"/>
               </a:rPr>
-              <a:t>R&amp;D Training Room 2</a:t>
-            </a:r>
+              <a:t>⬆ Auditorium</a:t>
+            </a:r>
+          </a:p>
+          <a:p>
+            <a:pPr>
+              <a:buClr>
+                <a:schemeClr val="tx2"/>
+              </a:buClr>
+              <a:buSzPct val="120000"/>
+            </a:pPr>
+            <a:r>
+              <a:rPr lang="en-US" sz="8800" b="1" dirty="0">
+                <a:solidFill>
+                  <a:schemeClr val="tx2"/>
+                </a:solidFill>
+                <a:latin typeface="Exo 2" panose="020B0604020202020204" charset="0"/>
+              </a:rPr>
+              <a:t>⬆ Bathrooms</a:t>
+            </a:r>
+          </a:p>
+          <a:p>
+            <a:pPr>
+              <a:buClr>
+                <a:schemeClr val="tx2"/>
+              </a:buClr>
+              <a:buSzPct val="120000"/>
+            </a:pPr>
+            <a:r>
+              <a:rPr lang="en-US" sz="8800" b="1" dirty="0">
+                <a:solidFill>
+                  <a:schemeClr val="tx2"/>
+                </a:solidFill>
+                <a:latin typeface="Exo 2" panose="020B0604020202020204" charset="0"/>
+              </a:rPr>
+              <a:t>⬆ Showers</a:t>
+            </a:r>
+            <a:endParaRPr lang="en-US" sz="15200" b="1" dirty="0">
+              <a:solidFill>
+                <a:schemeClr val="tx2"/>
+              </a:solidFill>
+              <a:latin typeface="Exo 2" panose="020B0604020202020204" charset="0"/>
+            </a:endParaRPr>
           </a:p>
         </p:txBody>
       </p:sp>
@@ -6274,7 +6334,7 @@
     </p:spTree>
     <p:extLst>
       <p:ext uri="{BB962C8B-B14F-4D97-AF65-F5344CB8AC3E}">
-        <p14:creationId xmlns:p14="http://schemas.microsoft.com/office/powerpoint/2010/main" val="4114772942"/>
+        <p14:creationId xmlns:p14="http://schemas.microsoft.com/office/powerpoint/2010/main" val="1841479852"/>
       </p:ext>
     </p:extLst>
   </p:cSld>
@@ -6415,7 +6475,7 @@
     </p:spTree>
     <p:extLst>
       <p:ext uri="{BB962C8B-B14F-4D97-AF65-F5344CB8AC3E}">
-        <p14:creationId xmlns:p14="http://schemas.microsoft.com/office/powerpoint/2010/main" val="3074355170"/>
+        <p14:creationId xmlns:p14="http://schemas.microsoft.com/office/powerpoint/2010/main" val="2761513785"/>
       </p:ext>
     </p:extLst>
   </p:cSld>
@@ -6556,7 +6616,7 @@
     </p:spTree>
     <p:extLst>
       <p:ext uri="{BB962C8B-B14F-4D97-AF65-F5344CB8AC3E}">
-        <p14:creationId xmlns:p14="http://schemas.microsoft.com/office/powerpoint/2010/main" val="2145648834"/>
+        <p14:creationId xmlns:p14="http://schemas.microsoft.com/office/powerpoint/2010/main" val="640611824"/>
       </p:ext>
     </p:extLst>
   </p:cSld>
@@ -6697,7 +6757,7 @@
     </p:spTree>
     <p:extLst>
       <p:ext uri="{BB962C8B-B14F-4D97-AF65-F5344CB8AC3E}">
-        <p14:creationId xmlns:p14="http://schemas.microsoft.com/office/powerpoint/2010/main" val="631599923"/>
+        <p14:creationId xmlns:p14="http://schemas.microsoft.com/office/powerpoint/2010/main" val="478431990"/>
       </p:ext>
     </p:extLst>
   </p:cSld>
@@ -6838,7 +6898,7 @@
     </p:spTree>
     <p:extLst>
       <p:ext uri="{BB962C8B-B14F-4D97-AF65-F5344CB8AC3E}">
-        <p14:creationId xmlns:p14="http://schemas.microsoft.com/office/powerpoint/2010/main" val="2857019866"/>
+        <p14:creationId xmlns:p14="http://schemas.microsoft.com/office/powerpoint/2010/main" val="3076896401"/>
       </p:ext>
     </p:extLst>
   </p:cSld>
@@ -6979,7 +7039,7 @@
     </p:spTree>
     <p:extLst>
       <p:ext uri="{BB962C8B-B14F-4D97-AF65-F5344CB8AC3E}">
-        <p14:creationId xmlns:p14="http://schemas.microsoft.com/office/powerpoint/2010/main" val="1578686445"/>
+        <p14:creationId xmlns:p14="http://schemas.microsoft.com/office/powerpoint/2010/main" val="951514696"/>
       </p:ext>
     </p:extLst>
   </p:cSld>
@@ -7120,7 +7180,7 @@
     </p:spTree>
     <p:extLst>
       <p:ext uri="{BB962C8B-B14F-4D97-AF65-F5344CB8AC3E}">
-        <p14:creationId xmlns:p14="http://schemas.microsoft.com/office/powerpoint/2010/main" val="1950762354"/>
+        <p14:creationId xmlns:p14="http://schemas.microsoft.com/office/powerpoint/2010/main" val="3074355170"/>
       </p:ext>
     </p:extLst>
   </p:cSld>
@@ -7261,7 +7321,7 @@
     </p:spTree>
     <p:extLst>
       <p:ext uri="{BB962C8B-B14F-4D97-AF65-F5344CB8AC3E}">
-        <p14:creationId xmlns:p14="http://schemas.microsoft.com/office/powerpoint/2010/main" val="1503299122"/>
+        <p14:creationId xmlns:p14="http://schemas.microsoft.com/office/powerpoint/2010/main" val="2145648834"/>
       </p:ext>
     </p:extLst>
   </p:cSld>
@@ -7402,7 +7462,7 @@
     </p:spTree>
     <p:extLst>
       <p:ext uri="{BB962C8B-B14F-4D97-AF65-F5344CB8AC3E}">
-        <p14:creationId xmlns:p14="http://schemas.microsoft.com/office/powerpoint/2010/main" val="1669589462"/>
+        <p14:creationId xmlns:p14="http://schemas.microsoft.com/office/powerpoint/2010/main" val="631599923"/>
       </p:ext>
     </p:extLst>
   </p:cSld>
@@ -7543,7 +7603,7 @@
     </p:spTree>
     <p:extLst>
       <p:ext uri="{BB962C8B-B14F-4D97-AF65-F5344CB8AC3E}">
-        <p14:creationId xmlns:p14="http://schemas.microsoft.com/office/powerpoint/2010/main" val="3376492252"/>
+        <p14:creationId xmlns:p14="http://schemas.microsoft.com/office/powerpoint/2010/main" val="2857019866"/>
       </p:ext>
     </p:extLst>
   </p:cSld>
@@ -7684,7 +7744,7 @@
     </p:spTree>
     <p:extLst>
       <p:ext uri="{BB962C8B-B14F-4D97-AF65-F5344CB8AC3E}">
-        <p14:creationId xmlns:p14="http://schemas.microsoft.com/office/powerpoint/2010/main" val="3446590829"/>
+        <p14:creationId xmlns:p14="http://schemas.microsoft.com/office/powerpoint/2010/main" val="1578686445"/>
       </p:ext>
     </p:extLst>
   </p:cSld>
@@ -7725,8 +7785,8 @@
         </p:nvSpPr>
         <p:spPr>
           <a:xfrm>
-            <a:off x="0" y="1057275"/>
-            <a:ext cx="10058400" cy="5657850"/>
+            <a:off x="893618" y="1676833"/>
+            <a:ext cx="8271163" cy="4418734"/>
           </a:xfrm>
           <a:prstGeom prst="rect">
             <a:avLst/>
@@ -7756,16 +7816,61 @@
           <a:bodyPr rtlCol="0" anchor="ctr"/>
           <a:lstStyle/>
           <a:p>
-            <a:pPr algn="ctr"/>
-            <a:r>
-              <a:rPr lang="en-US" sz="10560" b="1" dirty="0">
+            <a:pPr>
+              <a:buClr>
+                <a:schemeClr val="tx2"/>
+              </a:buClr>
+              <a:buSzPct val="120000"/>
+            </a:pPr>
+            <a:r>
+              <a:rPr lang="en-US" sz="8800" b="1" dirty="0">
                 <a:solidFill>
                   <a:schemeClr val="tx2"/>
                 </a:solidFill>
                 <a:latin typeface="Exo 2" panose="020B0604020202020204" charset="0"/>
               </a:rPr>
-              <a:t>Rock &amp; Roll Hall of Fame</a:t>
-            </a:r>
+              <a:t>⬅ Auditorium</a:t>
+            </a:r>
+          </a:p>
+          <a:p>
+            <a:pPr>
+              <a:buClr>
+                <a:schemeClr val="tx2"/>
+              </a:buClr>
+              <a:buSzPct val="120000"/>
+            </a:pPr>
+            <a:r>
+              <a:rPr lang="en-US" sz="8800" b="1" dirty="0">
+                <a:solidFill>
+                  <a:schemeClr val="tx2"/>
+                </a:solidFill>
+                <a:latin typeface="Exo 2" panose="020B0604020202020204" charset="0"/>
+              </a:rPr>
+              <a:t>➡ Bathrooms</a:t>
+            </a:r>
+          </a:p>
+          <a:p>
+            <a:pPr>
+              <a:buClr>
+                <a:schemeClr val="tx2"/>
+              </a:buClr>
+              <a:buSzPct val="120000"/>
+            </a:pPr>
+            <a:r>
+              <a:rPr lang="en-US" sz="8800" b="1" dirty="0">
+                <a:solidFill>
+                  <a:schemeClr val="tx2"/>
+                </a:solidFill>
+                <a:latin typeface="Exo 2" panose="020B0604020202020204" charset="0"/>
+              </a:rPr>
+              <a:t>➡ Showers</a:t>
+            </a:r>
+            <a:endParaRPr lang="en-US" sz="15200" b="1" dirty="0">
+              <a:solidFill>
+                <a:schemeClr val="tx2"/>
+              </a:solidFill>
+              <a:latin typeface="Exo 2" panose="020B0604020202020204" charset="0"/>
+            </a:endParaRPr>
           </a:p>
         </p:txBody>
       </p:sp>
@@ -7821,7 +7926,7 @@
     </p:spTree>
     <p:extLst>
       <p:ext uri="{BB962C8B-B14F-4D97-AF65-F5344CB8AC3E}">
-        <p14:creationId xmlns:p14="http://schemas.microsoft.com/office/powerpoint/2010/main" val="3173608152"/>
+        <p14:creationId xmlns:p14="http://schemas.microsoft.com/office/powerpoint/2010/main" val="2273292795"/>
       </p:ext>
     </p:extLst>
   </p:cSld>
@@ -7962,7 +8067,7 @@
     </p:spTree>
     <p:extLst>
       <p:ext uri="{BB962C8B-B14F-4D97-AF65-F5344CB8AC3E}">
-        <p14:creationId xmlns:p14="http://schemas.microsoft.com/office/powerpoint/2010/main" val="2350106630"/>
+        <p14:creationId xmlns:p14="http://schemas.microsoft.com/office/powerpoint/2010/main" val="1950762354"/>
       </p:ext>
     </p:extLst>
   </p:cSld>
@@ -8046,7 +8151,7 @@
                 </a:solidFill>
                 <a:latin typeface="Exo 2" panose="020B0604020202020204" charset="0"/>
               </a:rPr>
-              <a:t>No Re-Entry</a:t>
+              <a:t>Off Limits</a:t>
             </a:r>
           </a:p>
         </p:txBody>
@@ -8103,7 +8208,7 @@
     </p:spTree>
     <p:extLst>
       <p:ext uri="{BB962C8B-B14F-4D97-AF65-F5344CB8AC3E}">
-        <p14:creationId xmlns:p14="http://schemas.microsoft.com/office/powerpoint/2010/main" val="886114589"/>
+        <p14:creationId xmlns:p14="http://schemas.microsoft.com/office/powerpoint/2010/main" val="1503299122"/>
       </p:ext>
     </p:extLst>
   </p:cSld>
@@ -8187,7 +8292,7 @@
                 </a:solidFill>
                 <a:latin typeface="Exo 2" panose="020B0604020202020204" charset="0"/>
               </a:rPr>
-              <a:t>No Re-Entry</a:t>
+              <a:t>Off Limits</a:t>
             </a:r>
           </a:p>
         </p:txBody>
@@ -8244,7 +8349,7 @@
     </p:spTree>
     <p:extLst>
       <p:ext uri="{BB962C8B-B14F-4D97-AF65-F5344CB8AC3E}">
-        <p14:creationId xmlns:p14="http://schemas.microsoft.com/office/powerpoint/2010/main" val="510108041"/>
+        <p14:creationId xmlns:p14="http://schemas.microsoft.com/office/powerpoint/2010/main" val="1669589462"/>
       </p:ext>
     </p:extLst>
   </p:cSld>
@@ -8328,7 +8433,7 @@
                 </a:solidFill>
                 <a:latin typeface="Exo 2" panose="020B0604020202020204" charset="0"/>
               </a:rPr>
-              <a:t>No Re-Entry</a:t>
+              <a:t>Off Limits</a:t>
             </a:r>
           </a:p>
         </p:txBody>
@@ -8385,7 +8490,7 @@
     </p:spTree>
     <p:extLst>
       <p:ext uri="{BB962C8B-B14F-4D97-AF65-F5344CB8AC3E}">
-        <p14:creationId xmlns:p14="http://schemas.microsoft.com/office/powerpoint/2010/main" val="147252842"/>
+        <p14:creationId xmlns:p14="http://schemas.microsoft.com/office/powerpoint/2010/main" val="3376492252"/>
       </p:ext>
     </p:extLst>
   </p:cSld>
@@ -8469,7 +8574,7 @@
                 </a:solidFill>
                 <a:latin typeface="Exo 2" panose="020B0604020202020204" charset="0"/>
               </a:rPr>
-              <a:t>No Re-Entry</a:t>
+              <a:t>Off Limits</a:t>
             </a:r>
           </a:p>
         </p:txBody>
@@ -8526,7 +8631,7 @@
     </p:spTree>
     <p:extLst>
       <p:ext uri="{BB962C8B-B14F-4D97-AF65-F5344CB8AC3E}">
-        <p14:creationId xmlns:p14="http://schemas.microsoft.com/office/powerpoint/2010/main" val="1265108392"/>
+        <p14:creationId xmlns:p14="http://schemas.microsoft.com/office/powerpoint/2010/main" val="3446590829"/>
       </p:ext>
     </p:extLst>
   </p:cSld>
@@ -8610,7 +8715,7 @@
                 </a:solidFill>
                 <a:latin typeface="Exo 2" panose="020B0604020202020204" charset="0"/>
               </a:rPr>
-              <a:t>No Re-Entry</a:t>
+              <a:t>Off Limits</a:t>
             </a:r>
           </a:p>
         </p:txBody>
@@ -8667,7 +8772,7 @@
     </p:spTree>
     <p:extLst>
       <p:ext uri="{BB962C8B-B14F-4D97-AF65-F5344CB8AC3E}">
-        <p14:creationId xmlns:p14="http://schemas.microsoft.com/office/powerpoint/2010/main" val="423414910"/>
+        <p14:creationId xmlns:p14="http://schemas.microsoft.com/office/powerpoint/2010/main" val="2350106630"/>
       </p:ext>
     </p:extLst>
   </p:cSld>
@@ -8808,7 +8913,7 @@
     </p:spTree>
     <p:extLst>
       <p:ext uri="{BB962C8B-B14F-4D97-AF65-F5344CB8AC3E}">
-        <p14:creationId xmlns:p14="http://schemas.microsoft.com/office/powerpoint/2010/main" val="2917482351"/>
+        <p14:creationId xmlns:p14="http://schemas.microsoft.com/office/powerpoint/2010/main" val="886114589"/>
       </p:ext>
     </p:extLst>
   </p:cSld>
@@ -8949,7 +9054,7 @@
     </p:spTree>
     <p:extLst>
       <p:ext uri="{BB962C8B-B14F-4D97-AF65-F5344CB8AC3E}">
-        <p14:creationId xmlns:p14="http://schemas.microsoft.com/office/powerpoint/2010/main" val="1636791293"/>
+        <p14:creationId xmlns:p14="http://schemas.microsoft.com/office/powerpoint/2010/main" val="510108041"/>
       </p:ext>
     </p:extLst>
   </p:cSld>
@@ -9090,7 +9195,148 @@
     </p:spTree>
     <p:extLst>
       <p:ext uri="{BB962C8B-B14F-4D97-AF65-F5344CB8AC3E}">
-        <p14:creationId xmlns:p14="http://schemas.microsoft.com/office/powerpoint/2010/main" val="2486209572"/>
+        <p14:creationId xmlns:p14="http://schemas.microsoft.com/office/powerpoint/2010/main" val="147252842"/>
+      </p:ext>
+    </p:extLst>
+  </p:cSld>
+  <p:clrMapOvr>
+    <a:masterClrMapping/>
+  </p:clrMapOvr>
+</p:sld>
+</file>
+
+<file path=ppt/slides/slide49.xml><?xml version="1.0" encoding="utf-8"?>
+<p:sld xmlns:a="http://schemas.openxmlformats.org/drawingml/2006/main" xmlns:r="http://schemas.openxmlformats.org/officeDocument/2006/relationships" xmlns:p="http://schemas.openxmlformats.org/presentationml/2006/main">
+  <p:cSld>
+    <p:spTree>
+      <p:nvGrpSpPr>
+        <p:cNvPr id="1" name=""/>
+        <p:cNvGrpSpPr/>
+        <p:nvPr/>
+      </p:nvGrpSpPr>
+      <p:grpSpPr>
+        <a:xfrm>
+          <a:off x="0" y="0"/>
+          <a:ext cx="0" cy="0"/>
+          <a:chOff x="0" y="0"/>
+          <a:chExt cx="0" cy="0"/>
+        </a:xfrm>
+      </p:grpSpPr>
+      <p:sp>
+        <p:nvSpPr>
+          <p:cNvPr id="4" name="Rectangle 3">
+            <a:extLst>
+              <a:ext uri="{FF2B5EF4-FFF2-40B4-BE49-F238E27FC236}">
+                <a16:creationId xmlns:a16="http://schemas.microsoft.com/office/drawing/2014/main" id="{A3037CE8-E512-468F-801E-888625E721B5}"/>
+              </a:ext>
+            </a:extLst>
+          </p:cNvPr>
+          <p:cNvSpPr/>
+          <p:nvPr/>
+        </p:nvSpPr>
+        <p:spPr>
+          <a:xfrm>
+            <a:off x="0" y="0"/>
+            <a:ext cx="10058400" cy="7772400"/>
+          </a:xfrm>
+          <a:prstGeom prst="rect">
+            <a:avLst/>
+          </a:prstGeom>
+          <a:solidFill>
+            <a:srgbClr val="CE0058">
+              <a:alpha val="50196"/>
+            </a:srgbClr>
+          </a:solidFill>
+          <a:ln>
+            <a:noFill/>
+          </a:ln>
+        </p:spPr>
+        <p:style>
+          <a:lnRef idx="2">
+            <a:schemeClr val="accent1">
+              <a:shade val="50000"/>
+            </a:schemeClr>
+          </a:lnRef>
+          <a:fillRef idx="1">
+            <a:schemeClr val="accent1"/>
+          </a:fillRef>
+          <a:effectRef idx="0">
+            <a:schemeClr val="accent1"/>
+          </a:effectRef>
+          <a:fontRef idx="minor">
+            <a:schemeClr val="lt1"/>
+          </a:fontRef>
+        </p:style>
+        <p:txBody>
+          <a:bodyPr rtlCol="0" anchor="ctr"/>
+          <a:lstStyle/>
+          <a:p>
+            <a:pPr algn="ctr"/>
+            <a:r>
+              <a:rPr lang="en-US" sz="12650" b="1" dirty="0">
+                <a:solidFill>
+                  <a:schemeClr val="tx2"/>
+                </a:solidFill>
+                <a:latin typeface="Exo 2" panose="020B0604020202020204" charset="0"/>
+              </a:rPr>
+              <a:t>No Re-Entry</a:t>
+            </a:r>
+          </a:p>
+        </p:txBody>
+      </p:sp>
+      <p:sp>
+        <p:nvSpPr>
+          <p:cNvPr id="7" name="TextBox 6">
+            <a:extLst>
+              <a:ext uri="{FF2B5EF4-FFF2-40B4-BE49-F238E27FC236}">
+                <a16:creationId xmlns:a16="http://schemas.microsoft.com/office/drawing/2014/main" id="{5C0117C4-9E90-44E8-9DE5-0AF354751E4F}"/>
+              </a:ext>
+            </a:extLst>
+          </p:cNvPr>
+          <p:cNvSpPr txBox="1"/>
+          <p:nvPr/>
+        </p:nvSpPr>
+        <p:spPr>
+          <a:xfrm>
+            <a:off x="7074891" y="7273802"/>
+            <a:ext cx="2983509" cy="498598"/>
+          </a:xfrm>
+          <a:prstGeom prst="rect">
+            <a:avLst/>
+          </a:prstGeom>
+          <a:noFill/>
+        </p:spPr>
+        <p:txBody>
+          <a:bodyPr wrap="none" rtlCol="0">
+            <a:spAutoFit/>
+          </a:bodyPr>
+          <a:lstStyle/>
+          <a:p>
+            <a:r>
+              <a:rPr lang="en-US" sz="2640" dirty="0">
+                <a:solidFill>
+                  <a:schemeClr val="accent1"/>
+                </a:solidFill>
+                <a:latin typeface="Yellowtail" panose="020B0604020202020204" charset="0"/>
+              </a:rPr>
+              <a:t>2023</a:t>
+            </a:r>
+            <a:r>
+              <a:rPr lang="en-US" sz="2640" dirty="0">
+                <a:solidFill>
+                  <a:schemeClr val="bg1"/>
+                </a:solidFill>
+                <a:latin typeface="Yellowtail" panose="020B0604020202020204" charset="0"/>
+              </a:rPr>
+              <a:t> Hyland Hackathon</a:t>
+            </a:r>
+          </a:p>
+        </p:txBody>
+      </p:sp>
+    </p:spTree>
+    <p:extLst>
+      <p:ext uri="{BB962C8B-B14F-4D97-AF65-F5344CB8AC3E}">
+        <p14:creationId xmlns:p14="http://schemas.microsoft.com/office/powerpoint/2010/main" val="1265108392"/>
       </p:ext>
     </p:extLst>
   </p:cSld>
@@ -9131,8 +9377,8 @@
         </p:nvSpPr>
         <p:spPr>
           <a:xfrm>
-            <a:off x="0" y="1057275"/>
-            <a:ext cx="10058400" cy="5657850"/>
+            <a:off x="893618" y="1676833"/>
+            <a:ext cx="8271163" cy="4418734"/>
           </a:xfrm>
           <a:prstGeom prst="rect">
             <a:avLst/>
@@ -9162,15 +9408,20 @@
           <a:bodyPr rtlCol="0" anchor="ctr"/>
           <a:lstStyle/>
           <a:p>
-            <a:pPr algn="ctr"/>
-            <a:r>
-              <a:rPr lang="en-US" sz="10560" b="1" dirty="0">
+            <a:pPr>
+              <a:buClr>
+                <a:schemeClr val="tx2"/>
+              </a:buClr>
+              <a:buSzPct val="120000"/>
+            </a:pPr>
+            <a:r>
+              <a:rPr lang="en-US" sz="8800" b="1" dirty="0">
                 <a:solidFill>
                   <a:schemeClr val="tx2"/>
                 </a:solidFill>
                 <a:latin typeface="Exo 2" panose="020B0604020202020204" charset="0"/>
               </a:rPr>
-              <a:t>Rock &amp; Roll Hall of Fame</a:t>
+              <a:t>⬆ Bathrooms</a:t>
             </a:r>
           </a:p>
         </p:txBody>
@@ -9227,7 +9478,571 @@
     </p:spTree>
     <p:extLst>
       <p:ext uri="{BB962C8B-B14F-4D97-AF65-F5344CB8AC3E}">
-        <p14:creationId xmlns:p14="http://schemas.microsoft.com/office/powerpoint/2010/main" val="784875926"/>
+        <p14:creationId xmlns:p14="http://schemas.microsoft.com/office/powerpoint/2010/main" val="3083642332"/>
+      </p:ext>
+    </p:extLst>
+  </p:cSld>
+  <p:clrMapOvr>
+    <a:masterClrMapping/>
+  </p:clrMapOvr>
+</p:sld>
+</file>
+
+<file path=ppt/slides/slide50.xml><?xml version="1.0" encoding="utf-8"?>
+<p:sld xmlns:a="http://schemas.openxmlformats.org/drawingml/2006/main" xmlns:r="http://schemas.openxmlformats.org/officeDocument/2006/relationships" xmlns:p="http://schemas.openxmlformats.org/presentationml/2006/main">
+  <p:cSld>
+    <p:spTree>
+      <p:nvGrpSpPr>
+        <p:cNvPr id="1" name=""/>
+        <p:cNvGrpSpPr/>
+        <p:nvPr/>
+      </p:nvGrpSpPr>
+      <p:grpSpPr>
+        <a:xfrm>
+          <a:off x="0" y="0"/>
+          <a:ext cx="0" cy="0"/>
+          <a:chOff x="0" y="0"/>
+          <a:chExt cx="0" cy="0"/>
+        </a:xfrm>
+      </p:grpSpPr>
+      <p:sp>
+        <p:nvSpPr>
+          <p:cNvPr id="4" name="Rectangle 3">
+            <a:extLst>
+              <a:ext uri="{FF2B5EF4-FFF2-40B4-BE49-F238E27FC236}">
+                <a16:creationId xmlns:a16="http://schemas.microsoft.com/office/drawing/2014/main" id="{A3037CE8-E512-468F-801E-888625E721B5}"/>
+              </a:ext>
+            </a:extLst>
+          </p:cNvPr>
+          <p:cNvSpPr/>
+          <p:nvPr/>
+        </p:nvSpPr>
+        <p:spPr>
+          <a:xfrm>
+            <a:off x="0" y="0"/>
+            <a:ext cx="10058400" cy="7772400"/>
+          </a:xfrm>
+          <a:prstGeom prst="rect">
+            <a:avLst/>
+          </a:prstGeom>
+          <a:solidFill>
+            <a:srgbClr val="CE0058">
+              <a:alpha val="50196"/>
+            </a:srgbClr>
+          </a:solidFill>
+          <a:ln>
+            <a:noFill/>
+          </a:ln>
+        </p:spPr>
+        <p:style>
+          <a:lnRef idx="2">
+            <a:schemeClr val="accent1">
+              <a:shade val="50000"/>
+            </a:schemeClr>
+          </a:lnRef>
+          <a:fillRef idx="1">
+            <a:schemeClr val="accent1"/>
+          </a:fillRef>
+          <a:effectRef idx="0">
+            <a:schemeClr val="accent1"/>
+          </a:effectRef>
+          <a:fontRef idx="minor">
+            <a:schemeClr val="lt1"/>
+          </a:fontRef>
+        </p:style>
+        <p:txBody>
+          <a:bodyPr rtlCol="0" anchor="ctr"/>
+          <a:lstStyle/>
+          <a:p>
+            <a:pPr algn="ctr"/>
+            <a:r>
+              <a:rPr lang="en-US" sz="12650" b="1" dirty="0">
+                <a:solidFill>
+                  <a:schemeClr val="tx2"/>
+                </a:solidFill>
+                <a:latin typeface="Exo 2" panose="020B0604020202020204" charset="0"/>
+              </a:rPr>
+              <a:t>No Re-Entry</a:t>
+            </a:r>
+          </a:p>
+        </p:txBody>
+      </p:sp>
+      <p:sp>
+        <p:nvSpPr>
+          <p:cNvPr id="7" name="TextBox 6">
+            <a:extLst>
+              <a:ext uri="{FF2B5EF4-FFF2-40B4-BE49-F238E27FC236}">
+                <a16:creationId xmlns:a16="http://schemas.microsoft.com/office/drawing/2014/main" id="{5C0117C4-9E90-44E8-9DE5-0AF354751E4F}"/>
+              </a:ext>
+            </a:extLst>
+          </p:cNvPr>
+          <p:cNvSpPr txBox="1"/>
+          <p:nvPr/>
+        </p:nvSpPr>
+        <p:spPr>
+          <a:xfrm>
+            <a:off x="7074891" y="7273802"/>
+            <a:ext cx="2983509" cy="498598"/>
+          </a:xfrm>
+          <a:prstGeom prst="rect">
+            <a:avLst/>
+          </a:prstGeom>
+          <a:noFill/>
+        </p:spPr>
+        <p:txBody>
+          <a:bodyPr wrap="none" rtlCol="0">
+            <a:spAutoFit/>
+          </a:bodyPr>
+          <a:lstStyle/>
+          <a:p>
+            <a:r>
+              <a:rPr lang="en-US" sz="2640" dirty="0">
+                <a:solidFill>
+                  <a:schemeClr val="accent1"/>
+                </a:solidFill>
+                <a:latin typeface="Yellowtail" panose="020B0604020202020204" charset="0"/>
+              </a:rPr>
+              <a:t>2023</a:t>
+            </a:r>
+            <a:r>
+              <a:rPr lang="en-US" sz="2640" dirty="0">
+                <a:solidFill>
+                  <a:schemeClr val="bg1"/>
+                </a:solidFill>
+                <a:latin typeface="Yellowtail" panose="020B0604020202020204" charset="0"/>
+              </a:rPr>
+              <a:t> Hyland Hackathon</a:t>
+            </a:r>
+          </a:p>
+        </p:txBody>
+      </p:sp>
+    </p:spTree>
+    <p:extLst>
+      <p:ext uri="{BB962C8B-B14F-4D97-AF65-F5344CB8AC3E}">
+        <p14:creationId xmlns:p14="http://schemas.microsoft.com/office/powerpoint/2010/main" val="423414910"/>
+      </p:ext>
+    </p:extLst>
+  </p:cSld>
+  <p:clrMapOvr>
+    <a:masterClrMapping/>
+  </p:clrMapOvr>
+</p:sld>
+</file>
+
+<file path=ppt/slides/slide51.xml><?xml version="1.0" encoding="utf-8"?>
+<p:sld xmlns:a="http://schemas.openxmlformats.org/drawingml/2006/main" xmlns:r="http://schemas.openxmlformats.org/officeDocument/2006/relationships" xmlns:p="http://schemas.openxmlformats.org/presentationml/2006/main">
+  <p:cSld>
+    <p:spTree>
+      <p:nvGrpSpPr>
+        <p:cNvPr id="1" name=""/>
+        <p:cNvGrpSpPr/>
+        <p:nvPr/>
+      </p:nvGrpSpPr>
+      <p:grpSpPr>
+        <a:xfrm>
+          <a:off x="0" y="0"/>
+          <a:ext cx="0" cy="0"/>
+          <a:chOff x="0" y="0"/>
+          <a:chExt cx="0" cy="0"/>
+        </a:xfrm>
+      </p:grpSpPr>
+      <p:sp>
+        <p:nvSpPr>
+          <p:cNvPr id="4" name="Rectangle 3">
+            <a:extLst>
+              <a:ext uri="{FF2B5EF4-FFF2-40B4-BE49-F238E27FC236}">
+                <a16:creationId xmlns:a16="http://schemas.microsoft.com/office/drawing/2014/main" id="{A3037CE8-E512-468F-801E-888625E721B5}"/>
+              </a:ext>
+            </a:extLst>
+          </p:cNvPr>
+          <p:cNvSpPr/>
+          <p:nvPr/>
+        </p:nvSpPr>
+        <p:spPr>
+          <a:xfrm>
+            <a:off x="0" y="0"/>
+            <a:ext cx="10058400" cy="7772400"/>
+          </a:xfrm>
+          <a:prstGeom prst="rect">
+            <a:avLst/>
+          </a:prstGeom>
+          <a:solidFill>
+            <a:srgbClr val="CE0058">
+              <a:alpha val="50196"/>
+            </a:srgbClr>
+          </a:solidFill>
+          <a:ln>
+            <a:noFill/>
+          </a:ln>
+        </p:spPr>
+        <p:style>
+          <a:lnRef idx="2">
+            <a:schemeClr val="accent1">
+              <a:shade val="50000"/>
+            </a:schemeClr>
+          </a:lnRef>
+          <a:fillRef idx="1">
+            <a:schemeClr val="accent1"/>
+          </a:fillRef>
+          <a:effectRef idx="0">
+            <a:schemeClr val="accent1"/>
+          </a:effectRef>
+          <a:fontRef idx="minor">
+            <a:schemeClr val="lt1"/>
+          </a:fontRef>
+        </p:style>
+        <p:txBody>
+          <a:bodyPr rtlCol="0" anchor="ctr"/>
+          <a:lstStyle/>
+          <a:p>
+            <a:pPr algn="ctr"/>
+            <a:r>
+              <a:rPr lang="en-US" sz="12650" b="1" dirty="0">
+                <a:solidFill>
+                  <a:schemeClr val="tx2"/>
+                </a:solidFill>
+                <a:latin typeface="Exo 2" panose="020B0604020202020204" charset="0"/>
+              </a:rPr>
+              <a:t>No Re-Entry</a:t>
+            </a:r>
+          </a:p>
+        </p:txBody>
+      </p:sp>
+      <p:sp>
+        <p:nvSpPr>
+          <p:cNvPr id="7" name="TextBox 6">
+            <a:extLst>
+              <a:ext uri="{FF2B5EF4-FFF2-40B4-BE49-F238E27FC236}">
+                <a16:creationId xmlns:a16="http://schemas.microsoft.com/office/drawing/2014/main" id="{5C0117C4-9E90-44E8-9DE5-0AF354751E4F}"/>
+              </a:ext>
+            </a:extLst>
+          </p:cNvPr>
+          <p:cNvSpPr txBox="1"/>
+          <p:nvPr/>
+        </p:nvSpPr>
+        <p:spPr>
+          <a:xfrm>
+            <a:off x="7074891" y="7273802"/>
+            <a:ext cx="2983509" cy="498598"/>
+          </a:xfrm>
+          <a:prstGeom prst="rect">
+            <a:avLst/>
+          </a:prstGeom>
+          <a:noFill/>
+        </p:spPr>
+        <p:txBody>
+          <a:bodyPr wrap="none" rtlCol="0">
+            <a:spAutoFit/>
+          </a:bodyPr>
+          <a:lstStyle/>
+          <a:p>
+            <a:r>
+              <a:rPr lang="en-US" sz="2640" dirty="0">
+                <a:solidFill>
+                  <a:schemeClr val="accent1"/>
+                </a:solidFill>
+                <a:latin typeface="Yellowtail" panose="020B0604020202020204" charset="0"/>
+              </a:rPr>
+              <a:t>2023</a:t>
+            </a:r>
+            <a:r>
+              <a:rPr lang="en-US" sz="2640" dirty="0">
+                <a:solidFill>
+                  <a:schemeClr val="bg1"/>
+                </a:solidFill>
+                <a:latin typeface="Yellowtail" panose="020B0604020202020204" charset="0"/>
+              </a:rPr>
+              <a:t> Hyland Hackathon</a:t>
+            </a:r>
+          </a:p>
+        </p:txBody>
+      </p:sp>
+    </p:spTree>
+    <p:extLst>
+      <p:ext uri="{BB962C8B-B14F-4D97-AF65-F5344CB8AC3E}">
+        <p14:creationId xmlns:p14="http://schemas.microsoft.com/office/powerpoint/2010/main" val="2917482351"/>
+      </p:ext>
+    </p:extLst>
+  </p:cSld>
+  <p:clrMapOvr>
+    <a:masterClrMapping/>
+  </p:clrMapOvr>
+</p:sld>
+</file>
+
+<file path=ppt/slides/slide52.xml><?xml version="1.0" encoding="utf-8"?>
+<p:sld xmlns:a="http://schemas.openxmlformats.org/drawingml/2006/main" xmlns:r="http://schemas.openxmlformats.org/officeDocument/2006/relationships" xmlns:p="http://schemas.openxmlformats.org/presentationml/2006/main">
+  <p:cSld>
+    <p:spTree>
+      <p:nvGrpSpPr>
+        <p:cNvPr id="1" name=""/>
+        <p:cNvGrpSpPr/>
+        <p:nvPr/>
+      </p:nvGrpSpPr>
+      <p:grpSpPr>
+        <a:xfrm>
+          <a:off x="0" y="0"/>
+          <a:ext cx="0" cy="0"/>
+          <a:chOff x="0" y="0"/>
+          <a:chExt cx="0" cy="0"/>
+        </a:xfrm>
+      </p:grpSpPr>
+      <p:sp>
+        <p:nvSpPr>
+          <p:cNvPr id="4" name="Rectangle 3">
+            <a:extLst>
+              <a:ext uri="{FF2B5EF4-FFF2-40B4-BE49-F238E27FC236}">
+                <a16:creationId xmlns:a16="http://schemas.microsoft.com/office/drawing/2014/main" id="{A3037CE8-E512-468F-801E-888625E721B5}"/>
+              </a:ext>
+            </a:extLst>
+          </p:cNvPr>
+          <p:cNvSpPr/>
+          <p:nvPr/>
+        </p:nvSpPr>
+        <p:spPr>
+          <a:xfrm>
+            <a:off x="0" y="0"/>
+            <a:ext cx="10058400" cy="7772400"/>
+          </a:xfrm>
+          <a:prstGeom prst="rect">
+            <a:avLst/>
+          </a:prstGeom>
+          <a:solidFill>
+            <a:srgbClr val="CE0058">
+              <a:alpha val="50196"/>
+            </a:srgbClr>
+          </a:solidFill>
+          <a:ln>
+            <a:noFill/>
+          </a:ln>
+        </p:spPr>
+        <p:style>
+          <a:lnRef idx="2">
+            <a:schemeClr val="accent1">
+              <a:shade val="50000"/>
+            </a:schemeClr>
+          </a:lnRef>
+          <a:fillRef idx="1">
+            <a:schemeClr val="accent1"/>
+          </a:fillRef>
+          <a:effectRef idx="0">
+            <a:schemeClr val="accent1"/>
+          </a:effectRef>
+          <a:fontRef idx="minor">
+            <a:schemeClr val="lt1"/>
+          </a:fontRef>
+        </p:style>
+        <p:txBody>
+          <a:bodyPr rtlCol="0" anchor="ctr"/>
+          <a:lstStyle/>
+          <a:p>
+            <a:pPr algn="ctr"/>
+            <a:r>
+              <a:rPr lang="en-US" sz="12650" b="1" dirty="0">
+                <a:solidFill>
+                  <a:schemeClr val="tx2"/>
+                </a:solidFill>
+                <a:latin typeface="Exo 2" panose="020B0604020202020204" charset="0"/>
+              </a:rPr>
+              <a:t>No Re-Entry</a:t>
+            </a:r>
+          </a:p>
+        </p:txBody>
+      </p:sp>
+      <p:sp>
+        <p:nvSpPr>
+          <p:cNvPr id="7" name="TextBox 6">
+            <a:extLst>
+              <a:ext uri="{FF2B5EF4-FFF2-40B4-BE49-F238E27FC236}">
+                <a16:creationId xmlns:a16="http://schemas.microsoft.com/office/drawing/2014/main" id="{5C0117C4-9E90-44E8-9DE5-0AF354751E4F}"/>
+              </a:ext>
+            </a:extLst>
+          </p:cNvPr>
+          <p:cNvSpPr txBox="1"/>
+          <p:nvPr/>
+        </p:nvSpPr>
+        <p:spPr>
+          <a:xfrm>
+            <a:off x="7074891" y="7273802"/>
+            <a:ext cx="2983509" cy="498598"/>
+          </a:xfrm>
+          <a:prstGeom prst="rect">
+            <a:avLst/>
+          </a:prstGeom>
+          <a:noFill/>
+        </p:spPr>
+        <p:txBody>
+          <a:bodyPr wrap="none" rtlCol="0">
+            <a:spAutoFit/>
+          </a:bodyPr>
+          <a:lstStyle/>
+          <a:p>
+            <a:r>
+              <a:rPr lang="en-US" sz="2640" dirty="0">
+                <a:solidFill>
+                  <a:schemeClr val="accent1"/>
+                </a:solidFill>
+                <a:latin typeface="Yellowtail" panose="020B0604020202020204" charset="0"/>
+              </a:rPr>
+              <a:t>2023</a:t>
+            </a:r>
+            <a:r>
+              <a:rPr lang="en-US" sz="2640" dirty="0">
+                <a:solidFill>
+                  <a:schemeClr val="bg1"/>
+                </a:solidFill>
+                <a:latin typeface="Yellowtail" panose="020B0604020202020204" charset="0"/>
+              </a:rPr>
+              <a:t> Hyland Hackathon</a:t>
+            </a:r>
+          </a:p>
+        </p:txBody>
+      </p:sp>
+    </p:spTree>
+    <p:extLst>
+      <p:ext uri="{BB962C8B-B14F-4D97-AF65-F5344CB8AC3E}">
+        <p14:creationId xmlns:p14="http://schemas.microsoft.com/office/powerpoint/2010/main" val="1636791293"/>
+      </p:ext>
+    </p:extLst>
+  </p:cSld>
+  <p:clrMapOvr>
+    <a:masterClrMapping/>
+  </p:clrMapOvr>
+</p:sld>
+</file>
+
+<file path=ppt/slides/slide53.xml><?xml version="1.0" encoding="utf-8"?>
+<p:sld xmlns:a="http://schemas.openxmlformats.org/drawingml/2006/main" xmlns:r="http://schemas.openxmlformats.org/officeDocument/2006/relationships" xmlns:p="http://schemas.openxmlformats.org/presentationml/2006/main">
+  <p:cSld>
+    <p:spTree>
+      <p:nvGrpSpPr>
+        <p:cNvPr id="1" name=""/>
+        <p:cNvGrpSpPr/>
+        <p:nvPr/>
+      </p:nvGrpSpPr>
+      <p:grpSpPr>
+        <a:xfrm>
+          <a:off x="0" y="0"/>
+          <a:ext cx="0" cy="0"/>
+          <a:chOff x="0" y="0"/>
+          <a:chExt cx="0" cy="0"/>
+        </a:xfrm>
+      </p:grpSpPr>
+      <p:sp>
+        <p:nvSpPr>
+          <p:cNvPr id="4" name="Rectangle 3">
+            <a:extLst>
+              <a:ext uri="{FF2B5EF4-FFF2-40B4-BE49-F238E27FC236}">
+                <a16:creationId xmlns:a16="http://schemas.microsoft.com/office/drawing/2014/main" id="{A3037CE8-E512-468F-801E-888625E721B5}"/>
+              </a:ext>
+            </a:extLst>
+          </p:cNvPr>
+          <p:cNvSpPr/>
+          <p:nvPr/>
+        </p:nvSpPr>
+        <p:spPr>
+          <a:xfrm>
+            <a:off x="0" y="0"/>
+            <a:ext cx="10058400" cy="7772400"/>
+          </a:xfrm>
+          <a:prstGeom prst="rect">
+            <a:avLst/>
+          </a:prstGeom>
+          <a:solidFill>
+            <a:srgbClr val="CE0058">
+              <a:alpha val="50196"/>
+            </a:srgbClr>
+          </a:solidFill>
+          <a:ln>
+            <a:noFill/>
+          </a:ln>
+        </p:spPr>
+        <p:style>
+          <a:lnRef idx="2">
+            <a:schemeClr val="accent1">
+              <a:shade val="50000"/>
+            </a:schemeClr>
+          </a:lnRef>
+          <a:fillRef idx="1">
+            <a:schemeClr val="accent1"/>
+          </a:fillRef>
+          <a:effectRef idx="0">
+            <a:schemeClr val="accent1"/>
+          </a:effectRef>
+          <a:fontRef idx="minor">
+            <a:schemeClr val="lt1"/>
+          </a:fontRef>
+        </p:style>
+        <p:txBody>
+          <a:bodyPr rtlCol="0" anchor="ctr"/>
+          <a:lstStyle/>
+          <a:p>
+            <a:pPr algn="ctr"/>
+            <a:r>
+              <a:rPr lang="en-US" sz="12650" b="1" dirty="0">
+                <a:solidFill>
+                  <a:schemeClr val="tx2"/>
+                </a:solidFill>
+                <a:latin typeface="Exo 2" panose="020B0604020202020204" charset="0"/>
+              </a:rPr>
+              <a:t>No Re-Entry</a:t>
+            </a:r>
+          </a:p>
+        </p:txBody>
+      </p:sp>
+      <p:sp>
+        <p:nvSpPr>
+          <p:cNvPr id="7" name="TextBox 6">
+            <a:extLst>
+              <a:ext uri="{FF2B5EF4-FFF2-40B4-BE49-F238E27FC236}">
+                <a16:creationId xmlns:a16="http://schemas.microsoft.com/office/drawing/2014/main" id="{5C0117C4-9E90-44E8-9DE5-0AF354751E4F}"/>
+              </a:ext>
+            </a:extLst>
+          </p:cNvPr>
+          <p:cNvSpPr txBox="1"/>
+          <p:nvPr/>
+        </p:nvSpPr>
+        <p:spPr>
+          <a:xfrm>
+            <a:off x="7074891" y="7273802"/>
+            <a:ext cx="2983509" cy="498598"/>
+          </a:xfrm>
+          <a:prstGeom prst="rect">
+            <a:avLst/>
+          </a:prstGeom>
+          <a:noFill/>
+        </p:spPr>
+        <p:txBody>
+          <a:bodyPr wrap="none" rtlCol="0">
+            <a:spAutoFit/>
+          </a:bodyPr>
+          <a:lstStyle/>
+          <a:p>
+            <a:r>
+              <a:rPr lang="en-US" sz="2640" dirty="0">
+                <a:solidFill>
+                  <a:schemeClr val="accent1"/>
+                </a:solidFill>
+                <a:latin typeface="Yellowtail" panose="020B0604020202020204" charset="0"/>
+              </a:rPr>
+              <a:t>2023</a:t>
+            </a:r>
+            <a:r>
+              <a:rPr lang="en-US" sz="2640" dirty="0">
+                <a:solidFill>
+                  <a:schemeClr val="bg1"/>
+                </a:solidFill>
+                <a:latin typeface="Yellowtail" panose="020B0604020202020204" charset="0"/>
+              </a:rPr>
+              <a:t> Hyland Hackathon</a:t>
+            </a:r>
+          </a:p>
+        </p:txBody>
+      </p:sp>
+    </p:spTree>
+    <p:extLst>
+      <p:ext uri="{BB962C8B-B14F-4D97-AF65-F5344CB8AC3E}">
+        <p14:creationId xmlns:p14="http://schemas.microsoft.com/office/powerpoint/2010/main" val="2486209572"/>
       </p:ext>
     </p:extLst>
   </p:cSld>
@@ -9301,13 +10116,13 @@
           <a:p>
             <a:pPr algn="ctr"/>
             <a:r>
-              <a:rPr lang="en-US" sz="10560" b="1" dirty="0">
+              <a:rPr lang="en-US" sz="12650" b="1" dirty="0">
                 <a:solidFill>
                   <a:schemeClr val="tx2"/>
                 </a:solidFill>
                 <a:latin typeface="Exo 2" panose="020B0604020202020204" charset="0"/>
               </a:rPr>
-              <a:t>Pro Football Hall of Fame</a:t>
+              <a:t>Auditorium</a:t>
             </a:r>
           </a:p>
         </p:txBody>
@@ -9364,7 +10179,7 @@
     </p:spTree>
     <p:extLst>
       <p:ext uri="{BB962C8B-B14F-4D97-AF65-F5344CB8AC3E}">
-        <p14:creationId xmlns:p14="http://schemas.microsoft.com/office/powerpoint/2010/main" val="2436533205"/>
+        <p14:creationId xmlns:p14="http://schemas.microsoft.com/office/powerpoint/2010/main" val="593694673"/>
       </p:ext>
     </p:extLst>
   </p:cSld>
@@ -9438,13 +10253,13 @@
           <a:p>
             <a:pPr algn="ctr"/>
             <a:r>
-              <a:rPr lang="en-US" sz="10560" b="1" dirty="0">
+              <a:rPr lang="en-US" sz="12650" b="1" dirty="0">
                 <a:solidFill>
                   <a:schemeClr val="tx2"/>
                 </a:solidFill>
                 <a:latin typeface="Exo 2" panose="020B0604020202020204" charset="0"/>
               </a:rPr>
-              <a:t>Pro Football Hall of Fame</a:t>
+              <a:t>Auditorium</a:t>
             </a:r>
           </a:p>
         </p:txBody>
@@ -9501,7 +10316,7 @@
     </p:spTree>
     <p:extLst>
       <p:ext uri="{BB962C8B-B14F-4D97-AF65-F5344CB8AC3E}">
-        <p14:creationId xmlns:p14="http://schemas.microsoft.com/office/powerpoint/2010/main" val="813180451"/>
+        <p14:creationId xmlns:p14="http://schemas.microsoft.com/office/powerpoint/2010/main" val="3823049249"/>
       </p:ext>
     </p:extLst>
   </p:cSld>
@@ -9581,7 +10396,7 @@
                 </a:solidFill>
                 <a:latin typeface="Exo 2" panose="020B0604020202020204" charset="0"/>
               </a:rPr>
-              <a:t>Mentor Room</a:t>
+              <a:t>R&amp;D Training Room 2</a:t>
             </a:r>
           </a:p>
         </p:txBody>
@@ -9638,7 +10453,7 @@
     </p:spTree>
     <p:extLst>
       <p:ext uri="{BB962C8B-B14F-4D97-AF65-F5344CB8AC3E}">
-        <p14:creationId xmlns:p14="http://schemas.microsoft.com/office/powerpoint/2010/main" val="4246147517"/>
+        <p14:creationId xmlns:p14="http://schemas.microsoft.com/office/powerpoint/2010/main" val="4114772942"/>
       </p:ext>
     </p:extLst>
   </p:cSld>
@@ -9712,13 +10527,13 @@
           <a:p>
             <a:pPr algn="ctr"/>
             <a:r>
-              <a:rPr lang="en-US" sz="12650" b="1" dirty="0">
+              <a:rPr lang="en-US" sz="10560" b="1" dirty="0">
                 <a:solidFill>
                   <a:schemeClr val="tx2"/>
                 </a:solidFill>
                 <a:latin typeface="Exo 2" panose="020B0604020202020204" charset="0"/>
               </a:rPr>
-              <a:t>Mentor Room</a:t>
+              <a:t>Rock &amp; Roll Hall of Fame</a:t>
             </a:r>
           </a:p>
         </p:txBody>
@@ -9775,7 +10590,7 @@
     </p:spTree>
     <p:extLst>
       <p:ext uri="{BB962C8B-B14F-4D97-AF65-F5344CB8AC3E}">
-        <p14:creationId xmlns:p14="http://schemas.microsoft.com/office/powerpoint/2010/main" val="3132036243"/>
+        <p14:creationId xmlns:p14="http://schemas.microsoft.com/office/powerpoint/2010/main" val="3173608152"/>
       </p:ext>
     </p:extLst>
   </p:cSld>

</xml_diff>